<commit_message>
Major refactoring done on server
</commit_message>
<xml_diff>
--- a/Plan-of-Structure.pptx
+++ b/Plan-of-Structure.pptx
@@ -8,8 +8,8 @@
     <p:sldId id="256" r:id="rId2"/>
     <p:sldId id="260" r:id="rId3"/>
     <p:sldId id="257" r:id="rId4"/>
-    <p:sldId id="258" r:id="rId5"/>
-    <p:sldId id="259" r:id="rId6"/>
+    <p:sldId id="259" r:id="rId5"/>
+    <p:sldId id="258" r:id="rId6"/>
   </p:sldIdLst>
   <p:sldSz cx="12192000" cy="6858000"/>
   <p:notesSz cx="6858000" cy="9144000"/>
@@ -265,7 +265,7 @@
           <a:p>
             <a:fld id="{CECCE2B0-4AFD-42F4-9E0B-9CE98B87AC2C}" type="datetimeFigureOut">
               <a:rPr lang="en-IN" smtClean="0"/>
-              <a:t>31-03-2020</a:t>
+              <a:t>04-04-2020</a:t>
             </a:fld>
             <a:endParaRPr lang="en-IN" dirty="0"/>
           </a:p>
@@ -465,7 +465,7 @@
           <a:p>
             <a:fld id="{CECCE2B0-4AFD-42F4-9E0B-9CE98B87AC2C}" type="datetimeFigureOut">
               <a:rPr lang="en-IN" smtClean="0"/>
-              <a:t>31-03-2020</a:t>
+              <a:t>04-04-2020</a:t>
             </a:fld>
             <a:endParaRPr lang="en-IN" dirty="0"/>
           </a:p>
@@ -675,7 +675,7 @@
           <a:p>
             <a:fld id="{CECCE2B0-4AFD-42F4-9E0B-9CE98B87AC2C}" type="datetimeFigureOut">
               <a:rPr lang="en-IN" smtClean="0"/>
-              <a:t>31-03-2020</a:t>
+              <a:t>04-04-2020</a:t>
             </a:fld>
             <a:endParaRPr lang="en-IN" dirty="0"/>
           </a:p>
@@ -875,7 +875,7 @@
           <a:p>
             <a:fld id="{CECCE2B0-4AFD-42F4-9E0B-9CE98B87AC2C}" type="datetimeFigureOut">
               <a:rPr lang="en-IN" smtClean="0"/>
-              <a:t>31-03-2020</a:t>
+              <a:t>04-04-2020</a:t>
             </a:fld>
             <a:endParaRPr lang="en-IN" dirty="0"/>
           </a:p>
@@ -1151,7 +1151,7 @@
           <a:p>
             <a:fld id="{CECCE2B0-4AFD-42F4-9E0B-9CE98B87AC2C}" type="datetimeFigureOut">
               <a:rPr lang="en-IN" smtClean="0"/>
-              <a:t>31-03-2020</a:t>
+              <a:t>04-04-2020</a:t>
             </a:fld>
             <a:endParaRPr lang="en-IN" dirty="0"/>
           </a:p>
@@ -1419,7 +1419,7 @@
           <a:p>
             <a:fld id="{CECCE2B0-4AFD-42F4-9E0B-9CE98B87AC2C}" type="datetimeFigureOut">
               <a:rPr lang="en-IN" smtClean="0"/>
-              <a:t>31-03-2020</a:t>
+              <a:t>04-04-2020</a:t>
             </a:fld>
             <a:endParaRPr lang="en-IN" dirty="0"/>
           </a:p>
@@ -1834,7 +1834,7 @@
           <a:p>
             <a:fld id="{CECCE2B0-4AFD-42F4-9E0B-9CE98B87AC2C}" type="datetimeFigureOut">
               <a:rPr lang="en-IN" smtClean="0"/>
-              <a:t>31-03-2020</a:t>
+              <a:t>04-04-2020</a:t>
             </a:fld>
             <a:endParaRPr lang="en-IN" dirty="0"/>
           </a:p>
@@ -1976,7 +1976,7 @@
           <a:p>
             <a:fld id="{CECCE2B0-4AFD-42F4-9E0B-9CE98B87AC2C}" type="datetimeFigureOut">
               <a:rPr lang="en-IN" smtClean="0"/>
-              <a:t>31-03-2020</a:t>
+              <a:t>04-04-2020</a:t>
             </a:fld>
             <a:endParaRPr lang="en-IN" dirty="0"/>
           </a:p>
@@ -2089,7 +2089,7 @@
           <a:p>
             <a:fld id="{CECCE2B0-4AFD-42F4-9E0B-9CE98B87AC2C}" type="datetimeFigureOut">
               <a:rPr lang="en-IN" smtClean="0"/>
-              <a:t>31-03-2020</a:t>
+              <a:t>04-04-2020</a:t>
             </a:fld>
             <a:endParaRPr lang="en-IN" dirty="0"/>
           </a:p>
@@ -2402,7 +2402,7 @@
           <a:p>
             <a:fld id="{CECCE2B0-4AFD-42F4-9E0B-9CE98B87AC2C}" type="datetimeFigureOut">
               <a:rPr lang="en-IN" smtClean="0"/>
-              <a:t>31-03-2020</a:t>
+              <a:t>04-04-2020</a:t>
             </a:fld>
             <a:endParaRPr lang="en-IN" dirty="0"/>
           </a:p>
@@ -2691,7 +2691,7 @@
           <a:p>
             <a:fld id="{CECCE2B0-4AFD-42F4-9E0B-9CE98B87AC2C}" type="datetimeFigureOut">
               <a:rPr lang="en-IN" smtClean="0"/>
-              <a:t>31-03-2020</a:t>
+              <a:t>04-04-2020</a:t>
             </a:fld>
             <a:endParaRPr lang="en-IN" dirty="0"/>
           </a:p>
@@ -2934,7 +2934,7 @@
           <a:p>
             <a:fld id="{CECCE2B0-4AFD-42F4-9E0B-9CE98B87AC2C}" type="datetimeFigureOut">
               <a:rPr lang="en-IN" smtClean="0"/>
-              <a:t>31-03-2020</a:t>
+              <a:t>04-04-2020</a:t>
             </a:fld>
             <a:endParaRPr lang="en-IN" dirty="0"/>
           </a:p>
@@ -6990,10 +6990,10 @@
       </p:grpSpPr>
       <p:sp>
         <p:nvSpPr>
-          <p:cNvPr id="2" name="Rectangle 1">
-            <a:extLst>
-              <a:ext uri="{FF2B5EF4-FFF2-40B4-BE49-F238E27FC236}">
-                <a16:creationId xmlns:a16="http://schemas.microsoft.com/office/drawing/2014/main" id="{9BDA3951-CA54-47CA-939D-D26565AA8068}"/>
+          <p:cNvPr id="4" name="Rectangle: Rounded Corners 3">
+            <a:extLst>
+              <a:ext uri="{FF2B5EF4-FFF2-40B4-BE49-F238E27FC236}">
+                <a16:creationId xmlns:a16="http://schemas.microsoft.com/office/drawing/2014/main" id="{C5C7A4B6-C2D2-4FF1-B17A-730442036C48}"/>
               </a:ext>
             </a:extLst>
           </p:cNvPr>
@@ -7002,18 +7002,18 @@
         </p:nvSpPr>
         <p:spPr>
           <a:xfrm>
-            <a:off x="1" y="3959604"/>
-            <a:ext cx="12192000" cy="6568580"/>
-          </a:xfrm>
-          <a:prstGeom prst="rect">
-            <a:avLst/>
+            <a:off x="2932781" y="483549"/>
+            <a:ext cx="2750817" cy="4888201"/>
+          </a:xfrm>
+          <a:prstGeom prst="roundRect">
+            <a:avLst>
+              <a:gd name="adj" fmla="val 1543"/>
+            </a:avLst>
           </a:prstGeom>
           <a:solidFill>
-            <a:schemeClr val="bg1"/>
+            <a:srgbClr val="F3F3F3"/>
           </a:solidFill>
-          <a:ln>
-            <a:noFill/>
-          </a:ln>
+          <a:ln w="28575"/>
         </p:spPr>
         <p:style>
           <a:lnRef idx="2">
@@ -7042,71 +7042,10 @@
       </p:sp>
       <p:sp>
         <p:nvSpPr>
-          <p:cNvPr id="4" name="Rectangle 3">
-            <a:extLst>
-              <a:ext uri="{FF2B5EF4-FFF2-40B4-BE49-F238E27FC236}">
-                <a16:creationId xmlns:a16="http://schemas.microsoft.com/office/drawing/2014/main" id="{5DE535BE-9ECD-45F2-95A4-C4CB3266F8D3}"/>
-              </a:ext>
-            </a:extLst>
-          </p:cNvPr>
-          <p:cNvSpPr/>
-          <p:nvPr/>
-        </p:nvSpPr>
-        <p:spPr>
-          <a:xfrm>
-            <a:off x="0" y="1"/>
-            <a:ext cx="12192000" cy="813732"/>
-          </a:xfrm>
-          <a:prstGeom prst="rect">
-            <a:avLst/>
-          </a:prstGeom>
-          <a:solidFill>
-            <a:schemeClr val="bg1">
-              <a:lumMod val="95000"/>
-            </a:schemeClr>
-          </a:solidFill>
-          <a:ln>
-            <a:noFill/>
-          </a:ln>
-          <a:effectLst>
-            <a:outerShdw blurRad="50800" dist="38100" dir="5400000" algn="t" rotWithShape="0">
-              <a:prstClr val="black">
-                <a:alpha val="40000"/>
-              </a:prstClr>
-            </a:outerShdw>
-          </a:effectLst>
-        </p:spPr>
-        <p:style>
-          <a:lnRef idx="2">
-            <a:schemeClr val="accent1">
-              <a:shade val="50000"/>
-            </a:schemeClr>
-          </a:lnRef>
-          <a:fillRef idx="1">
-            <a:schemeClr val="accent1"/>
-          </a:fillRef>
-          <a:effectRef idx="0">
-            <a:schemeClr val="accent1"/>
-          </a:effectRef>
-          <a:fontRef idx="minor">
-            <a:schemeClr val="lt1"/>
-          </a:fontRef>
-        </p:style>
-        <p:txBody>
-          <a:bodyPr rtlCol="0" anchor="ctr"/>
-          <a:lstStyle/>
-          <a:p>
-            <a:pPr algn="ctr"/>
-            <a:endParaRPr lang="en-IN" dirty="0"/>
-          </a:p>
-        </p:txBody>
-      </p:sp>
-      <p:sp>
-        <p:nvSpPr>
           <p:cNvPr id="5" name="TextBox 4">
             <a:extLst>
               <a:ext uri="{FF2B5EF4-FFF2-40B4-BE49-F238E27FC236}">
-                <a16:creationId xmlns:a16="http://schemas.microsoft.com/office/drawing/2014/main" id="{C9C1B364-E904-4F0B-A1D2-754FA88C4CCF}"/>
+                <a16:creationId xmlns:a16="http://schemas.microsoft.com/office/drawing/2014/main" id="{5E1D5CBA-727D-45FF-AFBF-00A5390C2398}"/>
               </a:ext>
             </a:extLst>
           </p:cNvPr>
@@ -7115,8 +7054,8 @@
         </p:nvSpPr>
         <p:spPr>
           <a:xfrm>
-            <a:off x="285226" y="222200"/>
-            <a:ext cx="3341236" cy="461665"/>
+            <a:off x="3079263" y="640735"/>
+            <a:ext cx="1228926" cy="369332"/>
           </a:xfrm>
           <a:prstGeom prst="rect">
             <a:avLst/>
@@ -7130,270 +7069,6 @@
           <a:lstStyle/>
           <a:p>
             <a:r>
-              <a:rPr lang="en-US" sz="2400" b="1" dirty="0">
-                <a:latin typeface="Adobe Garamond Pro" panose="02020502060506020403" pitchFamily="18" charset="0"/>
-                <a:cs typeface="Aldhabi" panose="020B0604020202020204" pitchFamily="2" charset="-78"/>
-              </a:rPr>
-              <a:t>NITK AUCTIONS APP</a:t>
-            </a:r>
-            <a:endParaRPr lang="en-IN" sz="2400" b="1" dirty="0">
-              <a:latin typeface="Adobe Garamond Pro" panose="02020502060506020403" pitchFamily="18" charset="0"/>
-              <a:cs typeface="Aldhabi" panose="020B0604020202020204" pitchFamily="2" charset="-78"/>
-            </a:endParaRPr>
-          </a:p>
-        </p:txBody>
-      </p:sp>
-      <p:sp>
-        <p:nvSpPr>
-          <p:cNvPr id="6" name="TextBox 5">
-            <a:extLst>
-              <a:ext uri="{FF2B5EF4-FFF2-40B4-BE49-F238E27FC236}">
-                <a16:creationId xmlns:a16="http://schemas.microsoft.com/office/drawing/2014/main" id="{52646405-D68B-48FB-8196-A81398C0911F}"/>
-              </a:ext>
-            </a:extLst>
-          </p:cNvPr>
-          <p:cNvSpPr txBox="1"/>
-          <p:nvPr/>
-        </p:nvSpPr>
-        <p:spPr>
-          <a:xfrm>
-            <a:off x="11074495" y="222200"/>
-            <a:ext cx="832279" cy="369332"/>
-          </a:xfrm>
-          <a:prstGeom prst="rect">
-            <a:avLst/>
-          </a:prstGeom>
-          <a:noFill/>
-        </p:spPr>
-        <p:txBody>
-          <a:bodyPr wrap="none" rtlCol="0">
-            <a:spAutoFit/>
-          </a:bodyPr>
-          <a:lstStyle/>
-          <a:p>
-            <a:r>
-              <a:rPr lang="en-US" dirty="0">
-                <a:solidFill>
-                  <a:schemeClr val="tx1">
-                    <a:lumMod val="50000"/>
-                    <a:lumOff val="50000"/>
-                  </a:schemeClr>
-                </a:solidFill>
-              </a:rPr>
-              <a:t>Logout</a:t>
-            </a:r>
-            <a:endParaRPr lang="en-IN" dirty="0">
-              <a:solidFill>
-                <a:schemeClr val="tx1">
-                  <a:lumMod val="50000"/>
-                  <a:lumOff val="50000"/>
-                </a:schemeClr>
-              </a:solidFill>
-            </a:endParaRPr>
-          </a:p>
-        </p:txBody>
-      </p:sp>
-      <p:sp>
-        <p:nvSpPr>
-          <p:cNvPr id="7" name="TextBox 6">
-            <a:extLst>
-              <a:ext uri="{FF2B5EF4-FFF2-40B4-BE49-F238E27FC236}">
-                <a16:creationId xmlns:a16="http://schemas.microsoft.com/office/drawing/2014/main" id="{4C4EE17E-7AFC-4080-B315-3588F9D98004}"/>
-              </a:ext>
-            </a:extLst>
-          </p:cNvPr>
-          <p:cNvSpPr txBox="1"/>
-          <p:nvPr/>
-        </p:nvSpPr>
-        <p:spPr>
-          <a:xfrm>
-            <a:off x="9517594" y="222200"/>
-            <a:ext cx="1556901" cy="369332"/>
-          </a:xfrm>
-          <a:prstGeom prst="rect">
-            <a:avLst/>
-          </a:prstGeom>
-          <a:noFill/>
-        </p:spPr>
-        <p:txBody>
-          <a:bodyPr wrap="none" rtlCol="0">
-            <a:spAutoFit/>
-          </a:bodyPr>
-          <a:lstStyle/>
-          <a:p>
-            <a:r>
-              <a:rPr lang="en-US" u="sng" dirty="0"/>
-              <a:t>My Dashboard</a:t>
-            </a:r>
-            <a:endParaRPr lang="en-IN" u="sng" dirty="0"/>
-          </a:p>
-        </p:txBody>
-      </p:sp>
-      <p:sp>
-        <p:nvSpPr>
-          <p:cNvPr id="8" name="TextBox 7">
-            <a:extLst>
-              <a:ext uri="{FF2B5EF4-FFF2-40B4-BE49-F238E27FC236}">
-                <a16:creationId xmlns:a16="http://schemas.microsoft.com/office/drawing/2014/main" id="{DEF4271A-832A-42A3-97B0-D25E0DDC9C8C}"/>
-              </a:ext>
-            </a:extLst>
-          </p:cNvPr>
-          <p:cNvSpPr txBox="1"/>
-          <p:nvPr/>
-        </p:nvSpPr>
-        <p:spPr>
-          <a:xfrm>
-            <a:off x="7535898" y="222200"/>
-            <a:ext cx="1981696" cy="369332"/>
-          </a:xfrm>
-          <a:prstGeom prst="rect">
-            <a:avLst/>
-          </a:prstGeom>
-          <a:noFill/>
-        </p:spPr>
-        <p:txBody>
-          <a:bodyPr wrap="none" rtlCol="0">
-            <a:spAutoFit/>
-          </a:bodyPr>
-          <a:lstStyle/>
-          <a:p>
-            <a:r>
-              <a:rPr lang="en-US" dirty="0">
-                <a:solidFill>
-                  <a:schemeClr val="tx1">
-                    <a:lumMod val="50000"/>
-                    <a:lumOff val="50000"/>
-                  </a:schemeClr>
-                </a:solidFill>
-              </a:rPr>
-              <a:t>Auction Dashboard</a:t>
-            </a:r>
-          </a:p>
-        </p:txBody>
-      </p:sp>
-      <p:sp>
-        <p:nvSpPr>
-          <p:cNvPr id="9" name="TextBox 8">
-            <a:extLst>
-              <a:ext uri="{FF2B5EF4-FFF2-40B4-BE49-F238E27FC236}">
-                <a16:creationId xmlns:a16="http://schemas.microsoft.com/office/drawing/2014/main" id="{EDD590ED-775F-4DF6-9FA9-0D06E26CCA70}"/>
-              </a:ext>
-            </a:extLst>
-          </p:cNvPr>
-          <p:cNvSpPr txBox="1"/>
-          <p:nvPr/>
-        </p:nvSpPr>
-        <p:spPr>
-          <a:xfrm>
-            <a:off x="6489714" y="222200"/>
-            <a:ext cx="1046184" cy="369332"/>
-          </a:xfrm>
-          <a:prstGeom prst="rect">
-            <a:avLst/>
-          </a:prstGeom>
-          <a:noFill/>
-        </p:spPr>
-        <p:txBody>
-          <a:bodyPr wrap="none" rtlCol="0">
-            <a:spAutoFit/>
-          </a:bodyPr>
-          <a:lstStyle/>
-          <a:p>
-            <a:r>
-              <a:rPr lang="en-US" dirty="0">
-                <a:solidFill>
-                  <a:schemeClr val="tx1">
-                    <a:lumMod val="50000"/>
-                    <a:lumOff val="50000"/>
-                  </a:schemeClr>
-                </a:solidFill>
-              </a:rPr>
-              <a:t>Add Item</a:t>
-            </a:r>
-          </a:p>
-        </p:txBody>
-      </p:sp>
-      <p:sp>
-        <p:nvSpPr>
-          <p:cNvPr id="24" name="Rectangle: Rounded Corners 23">
-            <a:extLst>
-              <a:ext uri="{FF2B5EF4-FFF2-40B4-BE49-F238E27FC236}">
-                <a16:creationId xmlns:a16="http://schemas.microsoft.com/office/drawing/2014/main" id="{497FBC6B-9C10-4BE9-8346-8113506ED0A7}"/>
-              </a:ext>
-            </a:extLst>
-          </p:cNvPr>
-          <p:cNvSpPr/>
-          <p:nvPr/>
-        </p:nvSpPr>
-        <p:spPr>
-          <a:xfrm>
-            <a:off x="1617682" y="2052292"/>
-            <a:ext cx="2750817" cy="3291496"/>
-          </a:xfrm>
-          <a:prstGeom prst="roundRect">
-            <a:avLst>
-              <a:gd name="adj" fmla="val 1543"/>
-            </a:avLst>
-          </a:prstGeom>
-          <a:solidFill>
-            <a:srgbClr val="F3F3F3"/>
-          </a:solidFill>
-          <a:ln w="28575"/>
-        </p:spPr>
-        <p:style>
-          <a:lnRef idx="2">
-            <a:schemeClr val="accent1">
-              <a:shade val="50000"/>
-            </a:schemeClr>
-          </a:lnRef>
-          <a:fillRef idx="1">
-            <a:schemeClr val="accent1"/>
-          </a:fillRef>
-          <a:effectRef idx="0">
-            <a:schemeClr val="accent1"/>
-          </a:effectRef>
-          <a:fontRef idx="minor">
-            <a:schemeClr val="lt1"/>
-          </a:fontRef>
-        </p:style>
-        <p:txBody>
-          <a:bodyPr rtlCol="0" anchor="ctr"/>
-          <a:lstStyle/>
-          <a:p>
-            <a:pPr algn="ctr"/>
-            <a:endParaRPr lang="en-IN" dirty="0"/>
-          </a:p>
-        </p:txBody>
-      </p:sp>
-      <p:sp>
-        <p:nvSpPr>
-          <p:cNvPr id="25" name="TextBox 24">
-            <a:extLst>
-              <a:ext uri="{FF2B5EF4-FFF2-40B4-BE49-F238E27FC236}">
-                <a16:creationId xmlns:a16="http://schemas.microsoft.com/office/drawing/2014/main" id="{38AC78F3-6418-4B65-92CD-CD1E1F681F46}"/>
-              </a:ext>
-            </a:extLst>
-          </p:cNvPr>
-          <p:cNvSpPr txBox="1"/>
-          <p:nvPr/>
-        </p:nvSpPr>
-        <p:spPr>
-          <a:xfrm>
-            <a:off x="1764164" y="2209477"/>
-            <a:ext cx="1228926" cy="369332"/>
-          </a:xfrm>
-          <a:prstGeom prst="rect">
-            <a:avLst/>
-          </a:prstGeom>
-          <a:noFill/>
-        </p:spPr>
-        <p:txBody>
-          <a:bodyPr wrap="none" rtlCol="0">
-            <a:spAutoFit/>
-          </a:bodyPr>
-          <a:lstStyle/>
-          <a:p>
-            <a:r>
               <a:rPr lang="en-US" dirty="0"/>
               <a:t>Item Name</a:t>
             </a:r>
@@ -7403,10 +7078,10 @@
       </p:sp>
       <p:sp>
         <p:nvSpPr>
-          <p:cNvPr id="26" name="Rectangle: Rounded Corners 25">
-            <a:extLst>
-              <a:ext uri="{FF2B5EF4-FFF2-40B4-BE49-F238E27FC236}">
-                <a16:creationId xmlns:a16="http://schemas.microsoft.com/office/drawing/2014/main" id="{A631FC8E-2821-4AF2-8C84-96EF8E872C49}"/>
+          <p:cNvPr id="6" name="Rectangle: Rounded Corners 5">
+            <a:extLst>
+              <a:ext uri="{FF2B5EF4-FFF2-40B4-BE49-F238E27FC236}">
+                <a16:creationId xmlns:a16="http://schemas.microsoft.com/office/drawing/2014/main" id="{BF205299-41DD-4891-8B32-E035679EB84F}"/>
               </a:ext>
             </a:extLst>
           </p:cNvPr>
@@ -7415,7 +7090,7 @@
         </p:nvSpPr>
         <p:spPr>
           <a:xfrm>
-            <a:off x="1829154" y="2735994"/>
+            <a:off x="3144253" y="1167252"/>
             <a:ext cx="2327872" cy="2371720"/>
           </a:xfrm>
           <a:prstGeom prst="roundRect">
@@ -7473,10 +7148,54 @@
       </p:sp>
       <p:sp>
         <p:nvSpPr>
-          <p:cNvPr id="28" name="Rectangle: Rounded Corners 27">
-            <a:extLst>
-              <a:ext uri="{FF2B5EF4-FFF2-40B4-BE49-F238E27FC236}">
-                <a16:creationId xmlns:a16="http://schemas.microsoft.com/office/drawing/2014/main" id="{0A54A31B-6CE5-4EFD-9E36-BD4E5D5F98C0}"/>
+          <p:cNvPr id="7" name="TextBox 6">
+            <a:extLst>
+              <a:ext uri="{FF2B5EF4-FFF2-40B4-BE49-F238E27FC236}">
+                <a16:creationId xmlns:a16="http://schemas.microsoft.com/office/drawing/2014/main" id="{D4258EF9-4521-4AA0-878D-FD0F0BF6BDE3}"/>
+              </a:ext>
+            </a:extLst>
+          </p:cNvPr>
+          <p:cNvSpPr txBox="1"/>
+          <p:nvPr/>
+        </p:nvSpPr>
+        <p:spPr>
+          <a:xfrm>
+            <a:off x="3144253" y="3742564"/>
+            <a:ext cx="2327872" cy="1200329"/>
+          </a:xfrm>
+          <a:prstGeom prst="rect">
+            <a:avLst/>
+          </a:prstGeom>
+          <a:noFill/>
+        </p:spPr>
+        <p:txBody>
+          <a:bodyPr wrap="square" rtlCol="0">
+            <a:spAutoFit/>
+          </a:bodyPr>
+          <a:lstStyle/>
+          <a:p>
+            <a:pPr algn="just"/>
+            <a:r>
+              <a:rPr lang="en-US" sz="1200" b="1" dirty="0"/>
+              <a:t>Item Description </a:t>
+            </a:r>
+            <a:r>
+              <a:rPr lang="en-US" sz="1200" dirty="0"/>
+              <a:t>– </a:t>
+            </a:r>
+            <a:r>
+              <a:rPr lang="en-IN" sz="1200" dirty="0"/>
+              <a:t>Lorem ipsum dolor sit amet, fvfvfv consectetur adipiscing cvfvfv elit. Suspendisse aliquam pretium ex vitae laoreet. Etiam orci est, dapibus et posuere sit amet, posuere quis dui.</a:t>
+            </a:r>
+          </a:p>
+        </p:txBody>
+      </p:sp>
+      <p:sp>
+        <p:nvSpPr>
+          <p:cNvPr id="8" name="Rectangle: Rounded Corners 7">
+            <a:extLst>
+              <a:ext uri="{FF2B5EF4-FFF2-40B4-BE49-F238E27FC236}">
+                <a16:creationId xmlns:a16="http://schemas.microsoft.com/office/drawing/2014/main" id="{3CF6EFC3-E825-4478-ACAF-917F7A361A93}"/>
               </a:ext>
             </a:extLst>
           </p:cNvPr>
@@ -7485,7 +7204,7 @@
         </p:nvSpPr>
         <p:spPr>
           <a:xfrm>
-            <a:off x="1829153" y="4580606"/>
+            <a:off x="3144252" y="3011864"/>
             <a:ext cx="2327874" cy="527108"/>
           </a:xfrm>
           <a:prstGeom prst="roundRect">
@@ -7525,7 +7244,7 @@
                   <a:schemeClr val="bg1"/>
                 </a:solidFill>
               </a:rPr>
-              <a:t>Claim Now</a:t>
+              <a:t>Current Bid</a:t>
             </a:r>
             <a:endParaRPr lang="en-IN" sz="1400" dirty="0">
               <a:solidFill>
@@ -7537,10 +7256,10 @@
       </p:sp>
       <p:sp>
         <p:nvSpPr>
-          <p:cNvPr id="29" name="TextBox 28">
-            <a:extLst>
-              <a:ext uri="{FF2B5EF4-FFF2-40B4-BE49-F238E27FC236}">
-                <a16:creationId xmlns:a16="http://schemas.microsoft.com/office/drawing/2014/main" id="{63B01B59-6AC7-4BF4-9668-6BE02196A0B1}"/>
+          <p:cNvPr id="9" name="TextBox 8">
+            <a:extLst>
+              <a:ext uri="{FF2B5EF4-FFF2-40B4-BE49-F238E27FC236}">
+                <a16:creationId xmlns:a16="http://schemas.microsoft.com/office/drawing/2014/main" id="{427F8F30-B235-4648-A014-F37432D8F00A}"/>
               </a:ext>
             </a:extLst>
           </p:cNvPr>
@@ -7549,8 +7268,8 @@
         </p:nvSpPr>
         <p:spPr>
           <a:xfrm>
-            <a:off x="3724487" y="4671753"/>
-            <a:ext cx="357790" cy="369332"/>
+            <a:off x="5049449" y="3011864"/>
+            <a:ext cx="364202" cy="523220"/>
           </a:xfrm>
           <a:prstGeom prst="rect">
             <a:avLst/>
@@ -7564,22 +7283,71 @@
           <a:lstStyle/>
           <a:p>
             <a:r>
-              <a:rPr lang="en-IN" b="1" dirty="0">
+              <a:rPr lang="en-US" sz="2800" dirty="0">
                 <a:solidFill>
                   <a:schemeClr val="bg1"/>
                 </a:solidFill>
               </a:rPr>
-              <a:t>✓</a:t>
-            </a:r>
-          </a:p>
-        </p:txBody>
-      </p:sp>
-      <p:sp>
-        <p:nvSpPr>
-          <p:cNvPr id="31" name="Rectangle: Rounded Corners 30">
-            <a:extLst>
-              <a:ext uri="{FF2B5EF4-FFF2-40B4-BE49-F238E27FC236}">
-                <a16:creationId xmlns:a16="http://schemas.microsoft.com/office/drawing/2014/main" id="{220CBE65-9688-4F4C-8EC1-0E418D19BFC8}"/>
+              <a:t>+</a:t>
+            </a:r>
+            <a:endParaRPr lang="en-IN" sz="2800" dirty="0">
+              <a:solidFill>
+                <a:schemeClr val="bg1"/>
+              </a:solidFill>
+            </a:endParaRPr>
+          </a:p>
+        </p:txBody>
+      </p:sp>
+      <p:sp>
+        <p:nvSpPr>
+          <p:cNvPr id="10" name="TextBox 9">
+            <a:extLst>
+              <a:ext uri="{FF2B5EF4-FFF2-40B4-BE49-F238E27FC236}">
+                <a16:creationId xmlns:a16="http://schemas.microsoft.com/office/drawing/2014/main" id="{E7DD55BD-BE2A-42F0-98C0-EAE0C793214B}"/>
+              </a:ext>
+            </a:extLst>
+          </p:cNvPr>
+          <p:cNvSpPr txBox="1"/>
+          <p:nvPr/>
+        </p:nvSpPr>
+        <p:spPr>
+          <a:xfrm>
+            <a:off x="3141072" y="4961876"/>
+            <a:ext cx="936923" cy="276999"/>
+          </a:xfrm>
+          <a:prstGeom prst="rect">
+            <a:avLst/>
+          </a:prstGeom>
+          <a:noFill/>
+        </p:spPr>
+        <p:txBody>
+          <a:bodyPr wrap="none" rtlCol="0">
+            <a:spAutoFit/>
+          </a:bodyPr>
+          <a:lstStyle/>
+          <a:p>
+            <a:r>
+              <a:rPr lang="en-US" sz="1200" b="1" dirty="0">
+                <a:solidFill>
+                  <a:srgbClr val="0070C0"/>
+                </a:solidFill>
+              </a:rPr>
+              <a:t>MORE INFO</a:t>
+            </a:r>
+            <a:endParaRPr lang="en-IN" sz="1200" b="1" dirty="0">
+              <a:solidFill>
+                <a:srgbClr val="0070C0"/>
+              </a:solidFill>
+            </a:endParaRPr>
+          </a:p>
+        </p:txBody>
+      </p:sp>
+      <p:sp>
+        <p:nvSpPr>
+          <p:cNvPr id="11" name="Rectangle: Rounded Corners 10">
+            <a:extLst>
+              <a:ext uri="{FF2B5EF4-FFF2-40B4-BE49-F238E27FC236}">
+                <a16:creationId xmlns:a16="http://schemas.microsoft.com/office/drawing/2014/main" id="{8B564E93-A2D7-43D1-A5DC-62E930CF6390}"/>
               </a:ext>
             </a:extLst>
           </p:cNvPr>
@@ -7588,8 +7356,8 @@
         </p:nvSpPr>
         <p:spPr>
           <a:xfrm>
-            <a:off x="4576790" y="2052292"/>
-            <a:ext cx="2750817" cy="3291496"/>
+            <a:off x="6202527" y="483549"/>
+            <a:ext cx="2750817" cy="5791416"/>
           </a:xfrm>
           <a:prstGeom prst="roundRect">
             <a:avLst>
@@ -7628,10 +7396,10 @@
       </p:sp>
       <p:sp>
         <p:nvSpPr>
-          <p:cNvPr id="32" name="TextBox 31">
-            <a:extLst>
-              <a:ext uri="{FF2B5EF4-FFF2-40B4-BE49-F238E27FC236}">
-                <a16:creationId xmlns:a16="http://schemas.microsoft.com/office/drawing/2014/main" id="{BD8212A3-0A1C-40F8-8B1D-35375383BDA4}"/>
+          <p:cNvPr id="12" name="TextBox 11">
+            <a:extLst>
+              <a:ext uri="{FF2B5EF4-FFF2-40B4-BE49-F238E27FC236}">
+                <a16:creationId xmlns:a16="http://schemas.microsoft.com/office/drawing/2014/main" id="{573DBCFE-5D1B-4D63-91E7-D362FCF0952A}"/>
               </a:ext>
             </a:extLst>
           </p:cNvPr>
@@ -7640,7 +7408,7 @@
         </p:nvSpPr>
         <p:spPr>
           <a:xfrm>
-            <a:off x="4723272" y="2209477"/>
+            <a:off x="6349009" y="640735"/>
             <a:ext cx="1228926" cy="369332"/>
           </a:xfrm>
           <a:prstGeom prst="rect">
@@ -7664,10 +7432,10 @@
       </p:sp>
       <p:sp>
         <p:nvSpPr>
-          <p:cNvPr id="33" name="Rectangle: Rounded Corners 32">
-            <a:extLst>
-              <a:ext uri="{FF2B5EF4-FFF2-40B4-BE49-F238E27FC236}">
-                <a16:creationId xmlns:a16="http://schemas.microsoft.com/office/drawing/2014/main" id="{1E3949CD-2650-4D6B-B352-C795D217BF27}"/>
+          <p:cNvPr id="13" name="Rectangle: Rounded Corners 12">
+            <a:extLst>
+              <a:ext uri="{FF2B5EF4-FFF2-40B4-BE49-F238E27FC236}">
+                <a16:creationId xmlns:a16="http://schemas.microsoft.com/office/drawing/2014/main" id="{58C9E709-BD16-4F4B-8062-19524D25B801}"/>
               </a:ext>
             </a:extLst>
           </p:cNvPr>
@@ -7676,7 +7444,7 @@
         </p:nvSpPr>
         <p:spPr>
           <a:xfrm>
-            <a:off x="4788262" y="2735994"/>
+            <a:off x="6413999" y="1167252"/>
             <a:ext cx="2327872" cy="2371720"/>
           </a:xfrm>
           <a:prstGeom prst="roundRect">
@@ -7734,10 +7502,54 @@
       </p:sp>
       <p:sp>
         <p:nvSpPr>
-          <p:cNvPr id="35" name="Rectangle: Rounded Corners 34">
-            <a:extLst>
-              <a:ext uri="{FF2B5EF4-FFF2-40B4-BE49-F238E27FC236}">
-                <a16:creationId xmlns:a16="http://schemas.microsoft.com/office/drawing/2014/main" id="{F2F790D8-C5D0-4E11-9F29-523B5311266F}"/>
+          <p:cNvPr id="14" name="TextBox 13">
+            <a:extLst>
+              <a:ext uri="{FF2B5EF4-FFF2-40B4-BE49-F238E27FC236}">
+                <a16:creationId xmlns:a16="http://schemas.microsoft.com/office/drawing/2014/main" id="{91546BCC-FA5B-4DA4-9D43-18C7FB99B4D5}"/>
+              </a:ext>
+            </a:extLst>
+          </p:cNvPr>
+          <p:cNvSpPr txBox="1"/>
+          <p:nvPr/>
+        </p:nvSpPr>
+        <p:spPr>
+          <a:xfrm>
+            <a:off x="6413999" y="3742564"/>
+            <a:ext cx="2327872" cy="1200329"/>
+          </a:xfrm>
+          <a:prstGeom prst="rect">
+            <a:avLst/>
+          </a:prstGeom>
+          <a:noFill/>
+        </p:spPr>
+        <p:txBody>
+          <a:bodyPr wrap="square" rtlCol="0">
+            <a:spAutoFit/>
+          </a:bodyPr>
+          <a:lstStyle/>
+          <a:p>
+            <a:pPr algn="just"/>
+            <a:r>
+              <a:rPr lang="en-US" sz="1200" b="1" dirty="0"/>
+              <a:t>Item Description </a:t>
+            </a:r>
+            <a:r>
+              <a:rPr lang="en-US" sz="1200" dirty="0"/>
+              <a:t>– </a:t>
+            </a:r>
+            <a:r>
+              <a:rPr lang="en-IN" sz="1200" dirty="0"/>
+              <a:t>Lorem ipsum dolor sit amet, fvfvfv consectetur adipiscing cvfvfv elit. Suspendisse aliquam pretium ex vitae laoreet. Etiam orci est, dapibus et posuere sit amet, posuere quis dui.</a:t>
+            </a:r>
+          </a:p>
+        </p:txBody>
+      </p:sp>
+      <p:sp>
+        <p:nvSpPr>
+          <p:cNvPr id="15" name="Rectangle: Rounded Corners 14">
+            <a:extLst>
+              <a:ext uri="{FF2B5EF4-FFF2-40B4-BE49-F238E27FC236}">
+                <a16:creationId xmlns:a16="http://schemas.microsoft.com/office/drawing/2014/main" id="{AFF9747C-6A45-48DD-9A60-F73B36C7AADD}"/>
               </a:ext>
             </a:extLst>
           </p:cNvPr>
@@ -7746,7 +7558,7 @@
         </p:nvSpPr>
         <p:spPr>
           <a:xfrm>
-            <a:off x="4788261" y="4580606"/>
+            <a:off x="6413998" y="3011864"/>
             <a:ext cx="2327874" cy="527108"/>
           </a:xfrm>
           <a:prstGeom prst="roundRect">
@@ -7786,7 +7598,7 @@
                   <a:schemeClr val="bg1"/>
                 </a:solidFill>
               </a:rPr>
-              <a:t>Claim Now</a:t>
+              <a:t>Current Bid</a:t>
             </a:r>
             <a:endParaRPr lang="en-IN" sz="1400" dirty="0">
               <a:solidFill>
@@ -7798,62 +7610,10 @@
       </p:sp>
       <p:sp>
         <p:nvSpPr>
-          <p:cNvPr id="38" name="Rectangle: Rounded Corners 37">
-            <a:extLst>
-              <a:ext uri="{FF2B5EF4-FFF2-40B4-BE49-F238E27FC236}">
-                <a16:creationId xmlns:a16="http://schemas.microsoft.com/office/drawing/2014/main" id="{BA92E668-F26D-428C-BB17-CF23E219E10B}"/>
-              </a:ext>
-            </a:extLst>
-          </p:cNvPr>
-          <p:cNvSpPr/>
-          <p:nvPr/>
-        </p:nvSpPr>
-        <p:spPr>
-          <a:xfrm>
-            <a:off x="7535898" y="2052292"/>
-            <a:ext cx="2750817" cy="3291496"/>
-          </a:xfrm>
-          <a:prstGeom prst="roundRect">
-            <a:avLst>
-              <a:gd name="adj" fmla="val 1543"/>
-            </a:avLst>
-          </a:prstGeom>
-          <a:solidFill>
-            <a:srgbClr val="F3F3F3"/>
-          </a:solidFill>
-          <a:ln w="28575"/>
-        </p:spPr>
-        <p:style>
-          <a:lnRef idx="2">
-            <a:schemeClr val="accent1">
-              <a:shade val="50000"/>
-            </a:schemeClr>
-          </a:lnRef>
-          <a:fillRef idx="1">
-            <a:schemeClr val="accent1"/>
-          </a:fillRef>
-          <a:effectRef idx="0">
-            <a:schemeClr val="accent1"/>
-          </a:effectRef>
-          <a:fontRef idx="minor">
-            <a:schemeClr val="lt1"/>
-          </a:fontRef>
-        </p:style>
-        <p:txBody>
-          <a:bodyPr rtlCol="0" anchor="ctr"/>
-          <a:lstStyle/>
-          <a:p>
-            <a:pPr algn="ctr"/>
-            <a:endParaRPr lang="en-IN" dirty="0"/>
-          </a:p>
-        </p:txBody>
-      </p:sp>
-      <p:sp>
-        <p:nvSpPr>
-          <p:cNvPr id="39" name="TextBox 38">
-            <a:extLst>
-              <a:ext uri="{FF2B5EF4-FFF2-40B4-BE49-F238E27FC236}">
-                <a16:creationId xmlns:a16="http://schemas.microsoft.com/office/drawing/2014/main" id="{6FEBA26E-0B5D-4A69-8446-E06BD592889C}"/>
+          <p:cNvPr id="16" name="TextBox 15">
+            <a:extLst>
+              <a:ext uri="{FF2B5EF4-FFF2-40B4-BE49-F238E27FC236}">
+                <a16:creationId xmlns:a16="http://schemas.microsoft.com/office/drawing/2014/main" id="{8892E6A3-9B4D-48A9-8B80-B2B67776E308}"/>
               </a:ext>
             </a:extLst>
           </p:cNvPr>
@@ -7862,1257 +7622,7 @@
         </p:nvSpPr>
         <p:spPr>
           <a:xfrm>
-            <a:off x="7682380" y="2209477"/>
-            <a:ext cx="1228926" cy="369332"/>
-          </a:xfrm>
-          <a:prstGeom prst="rect">
-            <a:avLst/>
-          </a:prstGeom>
-          <a:noFill/>
-        </p:spPr>
-        <p:txBody>
-          <a:bodyPr wrap="none" rtlCol="0">
-            <a:spAutoFit/>
-          </a:bodyPr>
-          <a:lstStyle/>
-          <a:p>
-            <a:r>
-              <a:rPr lang="en-US" dirty="0"/>
-              <a:t>Item Name</a:t>
-            </a:r>
-            <a:endParaRPr lang="en-IN" dirty="0"/>
-          </a:p>
-        </p:txBody>
-      </p:sp>
-      <p:sp>
-        <p:nvSpPr>
-          <p:cNvPr id="40" name="Rectangle: Rounded Corners 39">
-            <a:extLst>
-              <a:ext uri="{FF2B5EF4-FFF2-40B4-BE49-F238E27FC236}">
-                <a16:creationId xmlns:a16="http://schemas.microsoft.com/office/drawing/2014/main" id="{98287C3F-26FF-485A-8614-DE29CCAC8BD2}"/>
-              </a:ext>
-            </a:extLst>
-          </p:cNvPr>
-          <p:cNvSpPr/>
-          <p:nvPr/>
-        </p:nvSpPr>
-        <p:spPr>
-          <a:xfrm>
-            <a:off x="7747370" y="2735994"/>
-            <a:ext cx="2327872" cy="2371720"/>
-          </a:xfrm>
-          <a:prstGeom prst="roundRect">
-            <a:avLst>
-              <a:gd name="adj" fmla="val 11213"/>
-            </a:avLst>
-          </a:prstGeom>
-          <a:solidFill>
-            <a:schemeClr val="bg1">
-              <a:lumMod val="95000"/>
-            </a:schemeClr>
-          </a:solidFill>
-          <a:ln w="28575"/>
-        </p:spPr>
-        <p:style>
-          <a:lnRef idx="2">
-            <a:schemeClr val="accent1">
-              <a:shade val="50000"/>
-            </a:schemeClr>
-          </a:lnRef>
-          <a:fillRef idx="1">
-            <a:schemeClr val="accent1"/>
-          </a:fillRef>
-          <a:effectRef idx="0">
-            <a:schemeClr val="accent1"/>
-          </a:effectRef>
-          <a:fontRef idx="minor">
-            <a:schemeClr val="lt1"/>
-          </a:fontRef>
-        </p:style>
-        <p:txBody>
-          <a:bodyPr rtlCol="0" anchor="ctr"/>
-          <a:lstStyle/>
-          <a:p>
-            <a:pPr algn="ctr"/>
-            <a:r>
-              <a:rPr lang="en-US" dirty="0">
-                <a:solidFill>
-                  <a:schemeClr val="bg2">
-                    <a:lumMod val="75000"/>
-                  </a:schemeClr>
-                </a:solidFill>
-              </a:rPr>
-              <a:t>image</a:t>
-            </a:r>
-            <a:endParaRPr lang="en-IN" dirty="0">
-              <a:solidFill>
-                <a:schemeClr val="bg2">
-                  <a:lumMod val="75000"/>
-                </a:schemeClr>
-              </a:solidFill>
-            </a:endParaRPr>
-          </a:p>
-        </p:txBody>
-      </p:sp>
-      <p:sp>
-        <p:nvSpPr>
-          <p:cNvPr id="42" name="Rectangle: Rounded Corners 41">
-            <a:extLst>
-              <a:ext uri="{FF2B5EF4-FFF2-40B4-BE49-F238E27FC236}">
-                <a16:creationId xmlns:a16="http://schemas.microsoft.com/office/drawing/2014/main" id="{709D0231-F3EF-4DE7-8EA2-679F89CF48C1}"/>
-              </a:ext>
-            </a:extLst>
-          </p:cNvPr>
-          <p:cNvSpPr/>
-          <p:nvPr/>
-        </p:nvSpPr>
-        <p:spPr>
-          <a:xfrm>
-            <a:off x="7747369" y="4580606"/>
-            <a:ext cx="2327874" cy="527108"/>
-          </a:xfrm>
-          <a:prstGeom prst="roundRect">
-            <a:avLst>
-              <a:gd name="adj" fmla="val 50000"/>
-            </a:avLst>
-          </a:prstGeom>
-          <a:solidFill>
-            <a:schemeClr val="accent5">
-              <a:lumMod val="75000"/>
-            </a:schemeClr>
-          </a:solidFill>
-        </p:spPr>
-        <p:style>
-          <a:lnRef idx="2">
-            <a:schemeClr val="accent1">
-              <a:shade val="50000"/>
-            </a:schemeClr>
-          </a:lnRef>
-          <a:fillRef idx="1">
-            <a:schemeClr val="accent1"/>
-          </a:fillRef>
-          <a:effectRef idx="0">
-            <a:schemeClr val="accent1"/>
-          </a:effectRef>
-          <a:fontRef idx="minor">
-            <a:schemeClr val="lt1"/>
-          </a:fontRef>
-        </p:style>
-        <p:txBody>
-          <a:bodyPr rtlCol="0" anchor="ctr"/>
-          <a:lstStyle/>
-          <a:p>
-            <a:r>
-              <a:rPr lang="en-US" sz="1400" dirty="0">
-                <a:solidFill>
-                  <a:schemeClr val="bg1"/>
-                </a:solidFill>
-              </a:rPr>
-              <a:t>Claim Now</a:t>
-            </a:r>
-            <a:endParaRPr lang="en-IN" sz="1400" dirty="0">
-              <a:solidFill>
-                <a:schemeClr val="bg1"/>
-              </a:solidFill>
-            </a:endParaRPr>
-          </a:p>
-        </p:txBody>
-      </p:sp>
-      <p:sp>
-        <p:nvSpPr>
-          <p:cNvPr id="45" name="TextBox 44">
-            <a:extLst>
-              <a:ext uri="{FF2B5EF4-FFF2-40B4-BE49-F238E27FC236}">
-                <a16:creationId xmlns:a16="http://schemas.microsoft.com/office/drawing/2014/main" id="{C6BF6E2C-A56C-40EC-988D-A954DF1647A3}"/>
-              </a:ext>
-            </a:extLst>
-          </p:cNvPr>
-          <p:cNvSpPr txBox="1"/>
-          <p:nvPr/>
-        </p:nvSpPr>
-        <p:spPr>
-          <a:xfrm>
-            <a:off x="1617682" y="1415184"/>
-            <a:ext cx="3868367" cy="461665"/>
-          </a:xfrm>
-          <a:prstGeom prst="rect">
-            <a:avLst/>
-          </a:prstGeom>
-          <a:noFill/>
-        </p:spPr>
-        <p:txBody>
-          <a:bodyPr wrap="none" rtlCol="0">
-            <a:spAutoFit/>
-          </a:bodyPr>
-          <a:lstStyle/>
-          <a:p>
-            <a:r>
-              <a:rPr lang="en-US" sz="2400" b="1" dirty="0">
-                <a:latin typeface="Adobe Garamond Pro" panose="02020502060506020403" pitchFamily="18" charset="0"/>
-                <a:cs typeface="Aldhabi" panose="020B0604020202020204" pitchFamily="2" charset="-78"/>
-              </a:rPr>
-              <a:t>CLAIM YOUR BIDS HERE</a:t>
-            </a:r>
-            <a:endParaRPr lang="en-IN" sz="2400" b="1" dirty="0">
-              <a:latin typeface="Adobe Garamond Pro" panose="02020502060506020403" pitchFamily="18" charset="0"/>
-              <a:cs typeface="Aldhabi" panose="020B0604020202020204" pitchFamily="2" charset="-78"/>
-            </a:endParaRPr>
-          </a:p>
-        </p:txBody>
-      </p:sp>
-      <p:sp>
-        <p:nvSpPr>
-          <p:cNvPr id="46" name="TextBox 45">
-            <a:extLst>
-              <a:ext uri="{FF2B5EF4-FFF2-40B4-BE49-F238E27FC236}">
-                <a16:creationId xmlns:a16="http://schemas.microsoft.com/office/drawing/2014/main" id="{FBCB83F6-9634-4F47-AE9F-214F5B31173C}"/>
-              </a:ext>
-            </a:extLst>
-          </p:cNvPr>
-          <p:cNvSpPr txBox="1"/>
-          <p:nvPr/>
-        </p:nvSpPr>
-        <p:spPr>
-          <a:xfrm>
-            <a:off x="9644293" y="4671753"/>
-            <a:ext cx="357790" cy="369332"/>
-          </a:xfrm>
-          <a:prstGeom prst="rect">
-            <a:avLst/>
-          </a:prstGeom>
-          <a:noFill/>
-        </p:spPr>
-        <p:txBody>
-          <a:bodyPr wrap="none" rtlCol="0">
-            <a:spAutoFit/>
-          </a:bodyPr>
-          <a:lstStyle/>
-          <a:p>
-            <a:r>
-              <a:rPr lang="en-IN" b="1" dirty="0">
-                <a:solidFill>
-                  <a:schemeClr val="bg1"/>
-                </a:solidFill>
-              </a:rPr>
-              <a:t>✓</a:t>
-            </a:r>
-          </a:p>
-        </p:txBody>
-      </p:sp>
-      <p:sp>
-        <p:nvSpPr>
-          <p:cNvPr id="47" name="TextBox 46">
-            <a:extLst>
-              <a:ext uri="{FF2B5EF4-FFF2-40B4-BE49-F238E27FC236}">
-                <a16:creationId xmlns:a16="http://schemas.microsoft.com/office/drawing/2014/main" id="{F3ACCF22-C91D-457D-A987-04CBA2FE561F}"/>
-              </a:ext>
-            </a:extLst>
-          </p:cNvPr>
-          <p:cNvSpPr txBox="1"/>
-          <p:nvPr/>
-        </p:nvSpPr>
-        <p:spPr>
-          <a:xfrm>
-            <a:off x="6687389" y="4659494"/>
-            <a:ext cx="357790" cy="369332"/>
-          </a:xfrm>
-          <a:prstGeom prst="rect">
-            <a:avLst/>
-          </a:prstGeom>
-          <a:noFill/>
-        </p:spPr>
-        <p:txBody>
-          <a:bodyPr wrap="none" rtlCol="0">
-            <a:spAutoFit/>
-          </a:bodyPr>
-          <a:lstStyle/>
-          <a:p>
-            <a:r>
-              <a:rPr lang="en-IN" b="1" dirty="0">
-                <a:solidFill>
-                  <a:schemeClr val="bg1"/>
-                </a:solidFill>
-              </a:rPr>
-              <a:t>✓</a:t>
-            </a:r>
-          </a:p>
-        </p:txBody>
-      </p:sp>
-      <p:sp>
-        <p:nvSpPr>
-          <p:cNvPr id="48" name="Rectangle: Rounded Corners 47">
-            <a:extLst>
-              <a:ext uri="{FF2B5EF4-FFF2-40B4-BE49-F238E27FC236}">
-                <a16:creationId xmlns:a16="http://schemas.microsoft.com/office/drawing/2014/main" id="{189B4A8B-5CB8-414C-80DD-FF5673DED17C}"/>
-              </a:ext>
-            </a:extLst>
-          </p:cNvPr>
-          <p:cNvSpPr/>
-          <p:nvPr/>
-        </p:nvSpPr>
-        <p:spPr>
-          <a:xfrm>
-            <a:off x="1617681" y="6692803"/>
-            <a:ext cx="2750817" cy="3291496"/>
-          </a:xfrm>
-          <a:prstGeom prst="roundRect">
-            <a:avLst>
-              <a:gd name="adj" fmla="val 1543"/>
-            </a:avLst>
-          </a:prstGeom>
-          <a:solidFill>
-            <a:srgbClr val="F3F3F3"/>
-          </a:solidFill>
-          <a:ln w="28575"/>
-        </p:spPr>
-        <p:style>
-          <a:lnRef idx="2">
-            <a:schemeClr val="accent1">
-              <a:shade val="50000"/>
-            </a:schemeClr>
-          </a:lnRef>
-          <a:fillRef idx="1">
-            <a:schemeClr val="accent1"/>
-          </a:fillRef>
-          <a:effectRef idx="0">
-            <a:schemeClr val="accent1"/>
-          </a:effectRef>
-          <a:fontRef idx="minor">
-            <a:schemeClr val="lt1"/>
-          </a:fontRef>
-        </p:style>
-        <p:txBody>
-          <a:bodyPr rtlCol="0" anchor="ctr"/>
-          <a:lstStyle/>
-          <a:p>
-            <a:pPr algn="ctr"/>
-            <a:endParaRPr lang="en-IN" dirty="0"/>
-          </a:p>
-        </p:txBody>
-      </p:sp>
-      <p:sp>
-        <p:nvSpPr>
-          <p:cNvPr id="49" name="TextBox 48">
-            <a:extLst>
-              <a:ext uri="{FF2B5EF4-FFF2-40B4-BE49-F238E27FC236}">
-                <a16:creationId xmlns:a16="http://schemas.microsoft.com/office/drawing/2014/main" id="{43270365-0837-468C-8DB5-7468014A991C}"/>
-              </a:ext>
-            </a:extLst>
-          </p:cNvPr>
-          <p:cNvSpPr txBox="1"/>
-          <p:nvPr/>
-        </p:nvSpPr>
-        <p:spPr>
-          <a:xfrm>
-            <a:off x="1764163" y="6849988"/>
-            <a:ext cx="1228926" cy="369332"/>
-          </a:xfrm>
-          <a:prstGeom prst="rect">
-            <a:avLst/>
-          </a:prstGeom>
-          <a:noFill/>
-        </p:spPr>
-        <p:txBody>
-          <a:bodyPr wrap="none" rtlCol="0">
-            <a:spAutoFit/>
-          </a:bodyPr>
-          <a:lstStyle/>
-          <a:p>
-            <a:r>
-              <a:rPr lang="en-US" dirty="0"/>
-              <a:t>Item Name</a:t>
-            </a:r>
-            <a:endParaRPr lang="en-IN" dirty="0"/>
-          </a:p>
-        </p:txBody>
-      </p:sp>
-      <p:sp>
-        <p:nvSpPr>
-          <p:cNvPr id="50" name="Rectangle: Rounded Corners 49">
-            <a:extLst>
-              <a:ext uri="{FF2B5EF4-FFF2-40B4-BE49-F238E27FC236}">
-                <a16:creationId xmlns:a16="http://schemas.microsoft.com/office/drawing/2014/main" id="{0C179944-9B38-4F9D-88FA-69A1877583EC}"/>
-              </a:ext>
-            </a:extLst>
-          </p:cNvPr>
-          <p:cNvSpPr/>
-          <p:nvPr/>
-        </p:nvSpPr>
-        <p:spPr>
-          <a:xfrm>
-            <a:off x="1829153" y="7376505"/>
-            <a:ext cx="2327872" cy="2371720"/>
-          </a:xfrm>
-          <a:prstGeom prst="roundRect">
-            <a:avLst>
-              <a:gd name="adj" fmla="val 11213"/>
-            </a:avLst>
-          </a:prstGeom>
-          <a:solidFill>
-            <a:schemeClr val="bg1">
-              <a:lumMod val="95000"/>
-            </a:schemeClr>
-          </a:solidFill>
-          <a:ln w="28575"/>
-        </p:spPr>
-        <p:style>
-          <a:lnRef idx="2">
-            <a:schemeClr val="accent1">
-              <a:shade val="50000"/>
-            </a:schemeClr>
-          </a:lnRef>
-          <a:fillRef idx="1">
-            <a:schemeClr val="accent1"/>
-          </a:fillRef>
-          <a:effectRef idx="0">
-            <a:schemeClr val="accent1"/>
-          </a:effectRef>
-          <a:fontRef idx="minor">
-            <a:schemeClr val="lt1"/>
-          </a:fontRef>
-        </p:style>
-        <p:txBody>
-          <a:bodyPr rtlCol="0" anchor="ctr"/>
-          <a:lstStyle/>
-          <a:p>
-            <a:pPr algn="ctr"/>
-            <a:r>
-              <a:rPr lang="en-US" dirty="0">
-                <a:solidFill>
-                  <a:schemeClr val="bg2">
-                    <a:lumMod val="75000"/>
-                  </a:schemeClr>
-                </a:solidFill>
-              </a:rPr>
-              <a:t>image</a:t>
-            </a:r>
-            <a:endParaRPr lang="en-IN" dirty="0">
-              <a:solidFill>
-                <a:schemeClr val="bg2">
-                  <a:lumMod val="75000"/>
-                </a:schemeClr>
-              </a:solidFill>
-            </a:endParaRPr>
-          </a:p>
-        </p:txBody>
-      </p:sp>
-      <p:sp>
-        <p:nvSpPr>
-          <p:cNvPr id="55" name="Rectangle: Rounded Corners 54">
-            <a:extLst>
-              <a:ext uri="{FF2B5EF4-FFF2-40B4-BE49-F238E27FC236}">
-                <a16:creationId xmlns:a16="http://schemas.microsoft.com/office/drawing/2014/main" id="{8F3AA717-5D95-4F42-B05F-DFBE00D0313E}"/>
-              </a:ext>
-            </a:extLst>
-          </p:cNvPr>
-          <p:cNvSpPr/>
-          <p:nvPr/>
-        </p:nvSpPr>
-        <p:spPr>
-          <a:xfrm>
-            <a:off x="4576789" y="6692803"/>
-            <a:ext cx="2750817" cy="3291496"/>
-          </a:xfrm>
-          <a:prstGeom prst="roundRect">
-            <a:avLst>
-              <a:gd name="adj" fmla="val 1543"/>
-            </a:avLst>
-          </a:prstGeom>
-          <a:solidFill>
-            <a:srgbClr val="F3F3F3"/>
-          </a:solidFill>
-          <a:ln w="28575"/>
-        </p:spPr>
-        <p:style>
-          <a:lnRef idx="2">
-            <a:schemeClr val="accent1">
-              <a:shade val="50000"/>
-            </a:schemeClr>
-          </a:lnRef>
-          <a:fillRef idx="1">
-            <a:schemeClr val="accent1"/>
-          </a:fillRef>
-          <a:effectRef idx="0">
-            <a:schemeClr val="accent1"/>
-          </a:effectRef>
-          <a:fontRef idx="minor">
-            <a:schemeClr val="lt1"/>
-          </a:fontRef>
-        </p:style>
-        <p:txBody>
-          <a:bodyPr rtlCol="0" anchor="ctr"/>
-          <a:lstStyle/>
-          <a:p>
-            <a:pPr algn="ctr"/>
-            <a:endParaRPr lang="en-IN" dirty="0"/>
-          </a:p>
-        </p:txBody>
-      </p:sp>
-      <p:sp>
-        <p:nvSpPr>
-          <p:cNvPr id="56" name="TextBox 55">
-            <a:extLst>
-              <a:ext uri="{FF2B5EF4-FFF2-40B4-BE49-F238E27FC236}">
-                <a16:creationId xmlns:a16="http://schemas.microsoft.com/office/drawing/2014/main" id="{7D45AD4A-9A50-4E87-A942-8E43658F21F2}"/>
-              </a:ext>
-            </a:extLst>
-          </p:cNvPr>
-          <p:cNvSpPr txBox="1"/>
-          <p:nvPr/>
-        </p:nvSpPr>
-        <p:spPr>
-          <a:xfrm>
-            <a:off x="4723271" y="6849988"/>
-            <a:ext cx="1228926" cy="369332"/>
-          </a:xfrm>
-          <a:prstGeom prst="rect">
-            <a:avLst/>
-          </a:prstGeom>
-          <a:noFill/>
-        </p:spPr>
-        <p:txBody>
-          <a:bodyPr wrap="none" rtlCol="0">
-            <a:spAutoFit/>
-          </a:bodyPr>
-          <a:lstStyle/>
-          <a:p>
-            <a:r>
-              <a:rPr lang="en-US" dirty="0"/>
-              <a:t>Item Name</a:t>
-            </a:r>
-            <a:endParaRPr lang="en-IN" dirty="0"/>
-          </a:p>
-        </p:txBody>
-      </p:sp>
-      <p:sp>
-        <p:nvSpPr>
-          <p:cNvPr id="57" name="Rectangle: Rounded Corners 56">
-            <a:extLst>
-              <a:ext uri="{FF2B5EF4-FFF2-40B4-BE49-F238E27FC236}">
-                <a16:creationId xmlns:a16="http://schemas.microsoft.com/office/drawing/2014/main" id="{55522410-F849-4ED3-BB37-FAE200FBD525}"/>
-              </a:ext>
-            </a:extLst>
-          </p:cNvPr>
-          <p:cNvSpPr/>
-          <p:nvPr/>
-        </p:nvSpPr>
-        <p:spPr>
-          <a:xfrm>
-            <a:off x="4788261" y="7376505"/>
-            <a:ext cx="2327872" cy="2371720"/>
-          </a:xfrm>
-          <a:prstGeom prst="roundRect">
-            <a:avLst>
-              <a:gd name="adj" fmla="val 11213"/>
-            </a:avLst>
-          </a:prstGeom>
-          <a:solidFill>
-            <a:schemeClr val="bg1">
-              <a:lumMod val="95000"/>
-            </a:schemeClr>
-          </a:solidFill>
-          <a:ln w="28575"/>
-        </p:spPr>
-        <p:style>
-          <a:lnRef idx="2">
-            <a:schemeClr val="accent1">
-              <a:shade val="50000"/>
-            </a:schemeClr>
-          </a:lnRef>
-          <a:fillRef idx="1">
-            <a:schemeClr val="accent1"/>
-          </a:fillRef>
-          <a:effectRef idx="0">
-            <a:schemeClr val="accent1"/>
-          </a:effectRef>
-          <a:fontRef idx="minor">
-            <a:schemeClr val="lt1"/>
-          </a:fontRef>
-        </p:style>
-        <p:txBody>
-          <a:bodyPr rtlCol="0" anchor="ctr"/>
-          <a:lstStyle/>
-          <a:p>
-            <a:pPr algn="ctr"/>
-            <a:r>
-              <a:rPr lang="en-US" dirty="0">
-                <a:solidFill>
-                  <a:schemeClr val="bg2">
-                    <a:lumMod val="75000"/>
-                  </a:schemeClr>
-                </a:solidFill>
-              </a:rPr>
-              <a:t>image</a:t>
-            </a:r>
-            <a:endParaRPr lang="en-IN" dirty="0">
-              <a:solidFill>
-                <a:schemeClr val="bg2">
-                  <a:lumMod val="75000"/>
-                </a:schemeClr>
-              </a:solidFill>
-            </a:endParaRPr>
-          </a:p>
-        </p:txBody>
-      </p:sp>
-      <p:sp>
-        <p:nvSpPr>
-          <p:cNvPr id="59" name="Rectangle: Rounded Corners 58">
-            <a:extLst>
-              <a:ext uri="{FF2B5EF4-FFF2-40B4-BE49-F238E27FC236}">
-                <a16:creationId xmlns:a16="http://schemas.microsoft.com/office/drawing/2014/main" id="{755C04A8-1C31-482F-AE4F-01056B92DEB1}"/>
-              </a:ext>
-            </a:extLst>
-          </p:cNvPr>
-          <p:cNvSpPr/>
-          <p:nvPr/>
-        </p:nvSpPr>
-        <p:spPr>
-          <a:xfrm>
-            <a:off x="7535897" y="6692803"/>
-            <a:ext cx="2750817" cy="3291496"/>
-          </a:xfrm>
-          <a:prstGeom prst="roundRect">
-            <a:avLst>
-              <a:gd name="adj" fmla="val 1543"/>
-            </a:avLst>
-          </a:prstGeom>
-          <a:solidFill>
-            <a:srgbClr val="F3F3F3"/>
-          </a:solidFill>
-          <a:ln w="28575"/>
-        </p:spPr>
-        <p:style>
-          <a:lnRef idx="2">
-            <a:schemeClr val="accent1">
-              <a:shade val="50000"/>
-            </a:schemeClr>
-          </a:lnRef>
-          <a:fillRef idx="1">
-            <a:schemeClr val="accent1"/>
-          </a:fillRef>
-          <a:effectRef idx="0">
-            <a:schemeClr val="accent1"/>
-          </a:effectRef>
-          <a:fontRef idx="minor">
-            <a:schemeClr val="lt1"/>
-          </a:fontRef>
-        </p:style>
-        <p:txBody>
-          <a:bodyPr rtlCol="0" anchor="ctr"/>
-          <a:lstStyle/>
-          <a:p>
-            <a:pPr algn="ctr"/>
-            <a:endParaRPr lang="en-IN" dirty="0"/>
-          </a:p>
-        </p:txBody>
-      </p:sp>
-      <p:sp>
-        <p:nvSpPr>
-          <p:cNvPr id="60" name="TextBox 59">
-            <a:extLst>
-              <a:ext uri="{FF2B5EF4-FFF2-40B4-BE49-F238E27FC236}">
-                <a16:creationId xmlns:a16="http://schemas.microsoft.com/office/drawing/2014/main" id="{F509F1EA-1457-4372-9B0F-C82B3B0A4AF1}"/>
-              </a:ext>
-            </a:extLst>
-          </p:cNvPr>
-          <p:cNvSpPr txBox="1"/>
-          <p:nvPr/>
-        </p:nvSpPr>
-        <p:spPr>
-          <a:xfrm>
-            <a:off x="7682379" y="6849988"/>
-            <a:ext cx="1228926" cy="369332"/>
-          </a:xfrm>
-          <a:prstGeom prst="rect">
-            <a:avLst/>
-          </a:prstGeom>
-          <a:noFill/>
-        </p:spPr>
-        <p:txBody>
-          <a:bodyPr wrap="none" rtlCol="0">
-            <a:spAutoFit/>
-          </a:bodyPr>
-          <a:lstStyle/>
-          <a:p>
-            <a:r>
-              <a:rPr lang="en-US" dirty="0"/>
-              <a:t>Item Name</a:t>
-            </a:r>
-            <a:endParaRPr lang="en-IN" dirty="0"/>
-          </a:p>
-        </p:txBody>
-      </p:sp>
-      <p:sp>
-        <p:nvSpPr>
-          <p:cNvPr id="61" name="Rectangle: Rounded Corners 60">
-            <a:extLst>
-              <a:ext uri="{FF2B5EF4-FFF2-40B4-BE49-F238E27FC236}">
-                <a16:creationId xmlns:a16="http://schemas.microsoft.com/office/drawing/2014/main" id="{017C42E3-7768-400D-AA4F-1371076CFFE1}"/>
-              </a:ext>
-            </a:extLst>
-          </p:cNvPr>
-          <p:cNvSpPr/>
-          <p:nvPr/>
-        </p:nvSpPr>
-        <p:spPr>
-          <a:xfrm>
-            <a:off x="7747369" y="7376505"/>
-            <a:ext cx="2327872" cy="2371720"/>
-          </a:xfrm>
-          <a:prstGeom prst="roundRect">
-            <a:avLst>
-              <a:gd name="adj" fmla="val 11213"/>
-            </a:avLst>
-          </a:prstGeom>
-          <a:solidFill>
-            <a:schemeClr val="bg1">
-              <a:lumMod val="95000"/>
-            </a:schemeClr>
-          </a:solidFill>
-          <a:ln w="28575"/>
-        </p:spPr>
-        <p:style>
-          <a:lnRef idx="2">
-            <a:schemeClr val="accent1">
-              <a:shade val="50000"/>
-            </a:schemeClr>
-          </a:lnRef>
-          <a:fillRef idx="1">
-            <a:schemeClr val="accent1"/>
-          </a:fillRef>
-          <a:effectRef idx="0">
-            <a:schemeClr val="accent1"/>
-          </a:effectRef>
-          <a:fontRef idx="minor">
-            <a:schemeClr val="lt1"/>
-          </a:fontRef>
-        </p:style>
-        <p:txBody>
-          <a:bodyPr rtlCol="0" anchor="ctr"/>
-          <a:lstStyle/>
-          <a:p>
-            <a:pPr algn="ctr"/>
-            <a:r>
-              <a:rPr lang="en-US" dirty="0">
-                <a:solidFill>
-                  <a:schemeClr val="bg2">
-                    <a:lumMod val="75000"/>
-                  </a:schemeClr>
-                </a:solidFill>
-              </a:rPr>
-              <a:t>image</a:t>
-            </a:r>
-            <a:endParaRPr lang="en-IN" dirty="0">
-              <a:solidFill>
-                <a:schemeClr val="bg2">
-                  <a:lumMod val="75000"/>
-                </a:schemeClr>
-              </a:solidFill>
-            </a:endParaRPr>
-          </a:p>
-        </p:txBody>
-      </p:sp>
-      <p:sp>
-        <p:nvSpPr>
-          <p:cNvPr id="63" name="TextBox 62">
-            <a:extLst>
-              <a:ext uri="{FF2B5EF4-FFF2-40B4-BE49-F238E27FC236}">
-                <a16:creationId xmlns:a16="http://schemas.microsoft.com/office/drawing/2014/main" id="{5BEEA67F-3644-4FC0-9D5E-7C67552B9EF5}"/>
-              </a:ext>
-            </a:extLst>
-          </p:cNvPr>
-          <p:cNvSpPr txBox="1"/>
-          <p:nvPr/>
-        </p:nvSpPr>
-        <p:spPr>
-          <a:xfrm>
-            <a:off x="1617681" y="6055695"/>
-            <a:ext cx="2104359" cy="461665"/>
-          </a:xfrm>
-          <a:prstGeom prst="rect">
-            <a:avLst/>
-          </a:prstGeom>
-          <a:noFill/>
-        </p:spPr>
-        <p:txBody>
-          <a:bodyPr wrap="none" rtlCol="0">
-            <a:spAutoFit/>
-          </a:bodyPr>
-          <a:lstStyle/>
-          <a:p>
-            <a:r>
-              <a:rPr lang="en-US" sz="2400" b="1" dirty="0">
-                <a:latin typeface="Adobe Garamond Pro" panose="02020502060506020403" pitchFamily="18" charset="0"/>
-                <a:cs typeface="Aldhabi" panose="020B0604020202020204" pitchFamily="2" charset="-78"/>
-              </a:rPr>
-              <a:t>YOUR ITEMS</a:t>
-            </a:r>
-            <a:endParaRPr lang="en-IN" sz="2400" b="1" dirty="0">
-              <a:latin typeface="Adobe Garamond Pro" panose="02020502060506020403" pitchFamily="18" charset="0"/>
-              <a:cs typeface="Aldhabi" panose="020B0604020202020204" pitchFamily="2" charset="-78"/>
-            </a:endParaRPr>
-          </a:p>
-        </p:txBody>
-      </p:sp>
-      <p:sp>
-        <p:nvSpPr>
-          <p:cNvPr id="66" name="Oval 65">
-            <a:extLst>
-              <a:ext uri="{FF2B5EF4-FFF2-40B4-BE49-F238E27FC236}">
-                <a16:creationId xmlns:a16="http://schemas.microsoft.com/office/drawing/2014/main" id="{22314E0D-AA5E-4399-9730-315A96081F06}"/>
-              </a:ext>
-            </a:extLst>
-          </p:cNvPr>
-          <p:cNvSpPr/>
-          <p:nvPr/>
-        </p:nvSpPr>
-        <p:spPr>
-          <a:xfrm>
-            <a:off x="513024" y="3314134"/>
-            <a:ext cx="578841" cy="578841"/>
-          </a:xfrm>
-          <a:prstGeom prst="ellipse">
-            <a:avLst/>
-          </a:prstGeom>
-          <a:solidFill>
-            <a:schemeClr val="bg1">
-              <a:lumMod val="95000"/>
-            </a:schemeClr>
-          </a:solidFill>
-          <a:ln>
-            <a:noFill/>
-          </a:ln>
-          <a:effectLst>
-            <a:outerShdw blurRad="63500" sx="102000" sy="102000" algn="ctr" rotWithShape="0">
-              <a:prstClr val="black">
-                <a:alpha val="40000"/>
-              </a:prstClr>
-            </a:outerShdw>
-          </a:effectLst>
-        </p:spPr>
-        <p:style>
-          <a:lnRef idx="2">
-            <a:schemeClr val="accent1">
-              <a:shade val="50000"/>
-            </a:schemeClr>
-          </a:lnRef>
-          <a:fillRef idx="1">
-            <a:schemeClr val="accent1"/>
-          </a:fillRef>
-          <a:effectRef idx="0">
-            <a:schemeClr val="accent1"/>
-          </a:effectRef>
-          <a:fontRef idx="minor">
-            <a:schemeClr val="lt1"/>
-          </a:fontRef>
-        </p:style>
-        <p:txBody>
-          <a:bodyPr rtlCol="0" anchor="ctr"/>
-          <a:lstStyle/>
-          <a:p>
-            <a:pPr algn="ctr"/>
-            <a:r>
-              <a:rPr lang="en-US" sz="2400" dirty="0">
-                <a:solidFill>
-                  <a:schemeClr val="tx1">
-                    <a:lumMod val="50000"/>
-                    <a:lumOff val="50000"/>
-                  </a:schemeClr>
-                </a:solidFill>
-              </a:rPr>
-              <a:t>&lt;</a:t>
-            </a:r>
-            <a:endParaRPr lang="en-IN" sz="2400" dirty="0">
-              <a:solidFill>
-                <a:schemeClr val="tx1">
-                  <a:lumMod val="50000"/>
-                  <a:lumOff val="50000"/>
-                </a:schemeClr>
-              </a:solidFill>
-            </a:endParaRPr>
-          </a:p>
-        </p:txBody>
-      </p:sp>
-      <p:sp>
-        <p:nvSpPr>
-          <p:cNvPr id="67" name="Oval 66">
-            <a:extLst>
-              <a:ext uri="{FF2B5EF4-FFF2-40B4-BE49-F238E27FC236}">
-                <a16:creationId xmlns:a16="http://schemas.microsoft.com/office/drawing/2014/main" id="{B890A6EC-0969-4612-9D34-9954D17315E6}"/>
-              </a:ext>
-            </a:extLst>
-          </p:cNvPr>
-          <p:cNvSpPr/>
-          <p:nvPr/>
-        </p:nvSpPr>
-        <p:spPr>
-          <a:xfrm>
-            <a:off x="10785074" y="3314134"/>
-            <a:ext cx="578841" cy="578841"/>
-          </a:xfrm>
-          <a:prstGeom prst="ellipse">
-            <a:avLst/>
-          </a:prstGeom>
-          <a:solidFill>
-            <a:schemeClr val="bg1">
-              <a:lumMod val="95000"/>
-            </a:schemeClr>
-          </a:solidFill>
-          <a:ln>
-            <a:noFill/>
-          </a:ln>
-          <a:effectLst>
-            <a:outerShdw blurRad="63500" sx="102000" sy="102000" algn="ctr" rotWithShape="0">
-              <a:prstClr val="black">
-                <a:alpha val="40000"/>
-              </a:prstClr>
-            </a:outerShdw>
-          </a:effectLst>
-        </p:spPr>
-        <p:style>
-          <a:lnRef idx="2">
-            <a:schemeClr val="accent1">
-              <a:shade val="50000"/>
-            </a:schemeClr>
-          </a:lnRef>
-          <a:fillRef idx="1">
-            <a:schemeClr val="accent1"/>
-          </a:fillRef>
-          <a:effectRef idx="0">
-            <a:schemeClr val="accent1"/>
-          </a:effectRef>
-          <a:fontRef idx="minor">
-            <a:schemeClr val="lt1"/>
-          </a:fontRef>
-        </p:style>
-        <p:txBody>
-          <a:bodyPr rtlCol="0" anchor="ctr"/>
-          <a:lstStyle/>
-          <a:p>
-            <a:pPr algn="ctr"/>
-            <a:r>
-              <a:rPr lang="en-US" sz="2400" dirty="0">
-                <a:solidFill>
-                  <a:schemeClr val="tx1">
-                    <a:lumMod val="50000"/>
-                    <a:lumOff val="50000"/>
-                  </a:schemeClr>
-                </a:solidFill>
-              </a:rPr>
-              <a:t>&gt;</a:t>
-            </a:r>
-            <a:endParaRPr lang="en-IN" sz="2400" dirty="0">
-              <a:solidFill>
-                <a:schemeClr val="tx1">
-                  <a:lumMod val="50000"/>
-                  <a:lumOff val="50000"/>
-                </a:schemeClr>
-              </a:solidFill>
-            </a:endParaRPr>
-          </a:p>
-        </p:txBody>
-      </p:sp>
-      <p:sp>
-        <p:nvSpPr>
-          <p:cNvPr id="68" name="Oval 67">
-            <a:extLst>
-              <a:ext uri="{FF2B5EF4-FFF2-40B4-BE49-F238E27FC236}">
-                <a16:creationId xmlns:a16="http://schemas.microsoft.com/office/drawing/2014/main" id="{8733F54A-4820-4497-B836-1D991FE6D761}"/>
-              </a:ext>
-            </a:extLst>
-          </p:cNvPr>
-          <p:cNvSpPr/>
-          <p:nvPr/>
-        </p:nvSpPr>
-        <p:spPr>
-          <a:xfrm>
-            <a:off x="513024" y="8043025"/>
-            <a:ext cx="578841" cy="578841"/>
-          </a:xfrm>
-          <a:prstGeom prst="ellipse">
-            <a:avLst/>
-          </a:prstGeom>
-          <a:solidFill>
-            <a:schemeClr val="bg1">
-              <a:lumMod val="95000"/>
-            </a:schemeClr>
-          </a:solidFill>
-          <a:ln>
-            <a:noFill/>
-          </a:ln>
-          <a:effectLst>
-            <a:outerShdw blurRad="63500" sx="102000" sy="102000" algn="ctr" rotWithShape="0">
-              <a:prstClr val="black">
-                <a:alpha val="40000"/>
-              </a:prstClr>
-            </a:outerShdw>
-          </a:effectLst>
-        </p:spPr>
-        <p:style>
-          <a:lnRef idx="2">
-            <a:schemeClr val="accent1">
-              <a:shade val="50000"/>
-            </a:schemeClr>
-          </a:lnRef>
-          <a:fillRef idx="1">
-            <a:schemeClr val="accent1"/>
-          </a:fillRef>
-          <a:effectRef idx="0">
-            <a:schemeClr val="accent1"/>
-          </a:effectRef>
-          <a:fontRef idx="minor">
-            <a:schemeClr val="lt1"/>
-          </a:fontRef>
-        </p:style>
-        <p:txBody>
-          <a:bodyPr rtlCol="0" anchor="ctr"/>
-          <a:lstStyle/>
-          <a:p>
-            <a:pPr algn="ctr"/>
-            <a:r>
-              <a:rPr lang="en-US" sz="2400" dirty="0">
-                <a:solidFill>
-                  <a:schemeClr val="tx1">
-                    <a:lumMod val="50000"/>
-                    <a:lumOff val="50000"/>
-                  </a:schemeClr>
-                </a:solidFill>
-              </a:rPr>
-              <a:t>&lt;</a:t>
-            </a:r>
-            <a:endParaRPr lang="en-IN" sz="2400" dirty="0">
-              <a:solidFill>
-                <a:schemeClr val="tx1">
-                  <a:lumMod val="50000"/>
-                  <a:lumOff val="50000"/>
-                </a:schemeClr>
-              </a:solidFill>
-            </a:endParaRPr>
-          </a:p>
-        </p:txBody>
-      </p:sp>
-      <p:sp>
-        <p:nvSpPr>
-          <p:cNvPr id="69" name="Oval 68">
-            <a:extLst>
-              <a:ext uri="{FF2B5EF4-FFF2-40B4-BE49-F238E27FC236}">
-                <a16:creationId xmlns:a16="http://schemas.microsoft.com/office/drawing/2014/main" id="{69FE2423-AB58-4752-8A93-B5864A0F6AEC}"/>
-              </a:ext>
-            </a:extLst>
-          </p:cNvPr>
-          <p:cNvSpPr/>
-          <p:nvPr/>
-        </p:nvSpPr>
-        <p:spPr>
-          <a:xfrm>
-            <a:off x="10785074" y="8043025"/>
-            <a:ext cx="578841" cy="578841"/>
-          </a:xfrm>
-          <a:prstGeom prst="ellipse">
-            <a:avLst/>
-          </a:prstGeom>
-          <a:solidFill>
-            <a:schemeClr val="bg1">
-              <a:lumMod val="95000"/>
-            </a:schemeClr>
-          </a:solidFill>
-          <a:ln>
-            <a:noFill/>
-          </a:ln>
-          <a:effectLst>
-            <a:outerShdw blurRad="63500" sx="102000" sy="102000" algn="ctr" rotWithShape="0">
-              <a:prstClr val="black">
-                <a:alpha val="40000"/>
-              </a:prstClr>
-            </a:outerShdw>
-          </a:effectLst>
-        </p:spPr>
-        <p:style>
-          <a:lnRef idx="2">
-            <a:schemeClr val="accent1">
-              <a:shade val="50000"/>
-            </a:schemeClr>
-          </a:lnRef>
-          <a:fillRef idx="1">
-            <a:schemeClr val="accent1"/>
-          </a:fillRef>
-          <a:effectRef idx="0">
-            <a:schemeClr val="accent1"/>
-          </a:effectRef>
-          <a:fontRef idx="minor">
-            <a:schemeClr val="lt1"/>
-          </a:fontRef>
-        </p:style>
-        <p:txBody>
-          <a:bodyPr rtlCol="0" anchor="ctr"/>
-          <a:lstStyle/>
-          <a:p>
-            <a:pPr algn="ctr"/>
-            <a:r>
-              <a:rPr lang="en-US" sz="2400" dirty="0">
-                <a:solidFill>
-                  <a:schemeClr val="tx1">
-                    <a:lumMod val="50000"/>
-                    <a:lumOff val="50000"/>
-                  </a:schemeClr>
-                </a:solidFill>
-              </a:rPr>
-              <a:t>&gt;</a:t>
-            </a:r>
-            <a:endParaRPr lang="en-IN" sz="2400" dirty="0">
-              <a:solidFill>
-                <a:schemeClr val="tx1">
-                  <a:lumMod val="50000"/>
-                  <a:lumOff val="50000"/>
-                </a:schemeClr>
-              </a:solidFill>
-            </a:endParaRPr>
-          </a:p>
-        </p:txBody>
-      </p:sp>
-      <p:sp>
-        <p:nvSpPr>
-          <p:cNvPr id="70" name="Rectangle: Rounded Corners 69">
-            <a:extLst>
-              <a:ext uri="{FF2B5EF4-FFF2-40B4-BE49-F238E27FC236}">
-                <a16:creationId xmlns:a16="http://schemas.microsoft.com/office/drawing/2014/main" id="{0C9715F4-E37F-4369-AEBD-1ED18EAC78D0}"/>
-              </a:ext>
-            </a:extLst>
-          </p:cNvPr>
-          <p:cNvSpPr/>
-          <p:nvPr/>
-        </p:nvSpPr>
-        <p:spPr>
-          <a:xfrm>
-            <a:off x="1829151" y="9221117"/>
-            <a:ext cx="2327874" cy="527108"/>
-          </a:xfrm>
-          <a:prstGeom prst="roundRect">
-            <a:avLst>
-              <a:gd name="adj" fmla="val 50000"/>
-            </a:avLst>
-          </a:prstGeom>
-          <a:solidFill>
-            <a:schemeClr val="accent5">
-              <a:lumMod val="75000"/>
-            </a:schemeClr>
-          </a:solidFill>
-        </p:spPr>
-        <p:style>
-          <a:lnRef idx="2">
-            <a:schemeClr val="accent1">
-              <a:shade val="50000"/>
-            </a:schemeClr>
-          </a:lnRef>
-          <a:fillRef idx="1">
-            <a:schemeClr val="accent1"/>
-          </a:fillRef>
-          <a:effectRef idx="0">
-            <a:schemeClr val="accent1"/>
-          </a:effectRef>
-          <a:fontRef idx="minor">
-            <a:schemeClr val="lt1"/>
-          </a:fontRef>
-        </p:style>
-        <p:txBody>
-          <a:bodyPr rtlCol="0" anchor="ctr"/>
-          <a:lstStyle/>
-          <a:p>
-            <a:r>
-              <a:rPr lang="en-US" sz="1400" dirty="0">
-                <a:solidFill>
-                  <a:schemeClr val="bg1"/>
-                </a:solidFill>
-              </a:rPr>
-              <a:t>Currently Bidding</a:t>
-            </a:r>
-            <a:endParaRPr lang="en-IN" sz="1400" dirty="0">
-              <a:solidFill>
-                <a:schemeClr val="bg1"/>
-              </a:solidFill>
-            </a:endParaRPr>
-          </a:p>
-        </p:txBody>
-      </p:sp>
-      <p:sp>
-        <p:nvSpPr>
-          <p:cNvPr id="72" name="Rectangle: Rounded Corners 71">
-            <a:extLst>
-              <a:ext uri="{FF2B5EF4-FFF2-40B4-BE49-F238E27FC236}">
-                <a16:creationId xmlns:a16="http://schemas.microsoft.com/office/drawing/2014/main" id="{02F0572D-34E5-458F-B400-C18047CEFB12}"/>
-              </a:ext>
-            </a:extLst>
-          </p:cNvPr>
-          <p:cNvSpPr/>
-          <p:nvPr/>
-        </p:nvSpPr>
-        <p:spPr>
-          <a:xfrm>
-            <a:off x="4788259" y="9221117"/>
-            <a:ext cx="2327874" cy="527108"/>
-          </a:xfrm>
-          <a:prstGeom prst="roundRect">
-            <a:avLst>
-              <a:gd name="adj" fmla="val 50000"/>
-            </a:avLst>
-          </a:prstGeom>
-          <a:solidFill>
-            <a:schemeClr val="accent5">
-              <a:lumMod val="75000"/>
-            </a:schemeClr>
-          </a:solidFill>
-        </p:spPr>
-        <p:style>
-          <a:lnRef idx="2">
-            <a:schemeClr val="accent1">
-              <a:shade val="50000"/>
-            </a:schemeClr>
-          </a:lnRef>
-          <a:fillRef idx="1">
-            <a:schemeClr val="accent1"/>
-          </a:fillRef>
-          <a:effectRef idx="0">
-            <a:schemeClr val="accent1"/>
-          </a:effectRef>
-          <a:fontRef idx="minor">
-            <a:schemeClr val="lt1"/>
-          </a:fontRef>
-        </p:style>
-        <p:txBody>
-          <a:bodyPr rtlCol="0" anchor="ctr"/>
-          <a:lstStyle/>
-          <a:p>
-            <a:r>
-              <a:rPr lang="en-US" sz="1400" dirty="0">
-                <a:solidFill>
-                  <a:schemeClr val="bg1"/>
-                </a:solidFill>
-              </a:rPr>
-              <a:t>Claimed by XYZ</a:t>
-            </a:r>
-            <a:endParaRPr lang="en-IN" sz="1400" dirty="0">
-              <a:solidFill>
-                <a:schemeClr val="bg1"/>
-              </a:solidFill>
-            </a:endParaRPr>
-          </a:p>
-        </p:txBody>
-      </p:sp>
-      <p:sp>
-        <p:nvSpPr>
-          <p:cNvPr id="73" name="TextBox 72">
-            <a:extLst>
-              <a:ext uri="{FF2B5EF4-FFF2-40B4-BE49-F238E27FC236}">
-                <a16:creationId xmlns:a16="http://schemas.microsoft.com/office/drawing/2014/main" id="{DD5E9F02-F5E9-40D4-8176-8BA83A2E5EE8}"/>
-              </a:ext>
-            </a:extLst>
-          </p:cNvPr>
-          <p:cNvSpPr txBox="1"/>
-          <p:nvPr/>
-        </p:nvSpPr>
-        <p:spPr>
-          <a:xfrm>
-            <a:off x="6693456" y="9221117"/>
+            <a:off x="8319195" y="3011864"/>
             <a:ext cx="364202" cy="523220"/>
           </a:xfrm>
           <a:prstGeom prst="rect">
@@ -9144,74 +7654,10 @@
       </p:sp>
       <p:sp>
         <p:nvSpPr>
-          <p:cNvPr id="74" name="Rectangle: Rounded Corners 73">
-            <a:extLst>
-              <a:ext uri="{FF2B5EF4-FFF2-40B4-BE49-F238E27FC236}">
-                <a16:creationId xmlns:a16="http://schemas.microsoft.com/office/drawing/2014/main" id="{E86CADDE-1E1F-45DC-BEC6-85952951BC34}"/>
-              </a:ext>
-            </a:extLst>
-          </p:cNvPr>
-          <p:cNvSpPr/>
-          <p:nvPr/>
-        </p:nvSpPr>
-        <p:spPr>
-          <a:xfrm>
-            <a:off x="7747367" y="9221117"/>
-            <a:ext cx="2327874" cy="527108"/>
-          </a:xfrm>
-          <a:prstGeom prst="roundRect">
-            <a:avLst>
-              <a:gd name="adj" fmla="val 50000"/>
-            </a:avLst>
-          </a:prstGeom>
-          <a:solidFill>
-            <a:schemeClr val="accent5">
-              <a:lumMod val="75000"/>
-            </a:schemeClr>
-          </a:solidFill>
-        </p:spPr>
-        <p:style>
-          <a:lnRef idx="2">
-            <a:schemeClr val="accent1">
-              <a:shade val="50000"/>
-            </a:schemeClr>
-          </a:lnRef>
-          <a:fillRef idx="1">
-            <a:schemeClr val="accent1"/>
-          </a:fillRef>
-          <a:effectRef idx="0">
-            <a:schemeClr val="accent1"/>
-          </a:effectRef>
-          <a:fontRef idx="minor">
-            <a:schemeClr val="lt1"/>
-          </a:fontRef>
-        </p:style>
-        <p:txBody>
-          <a:bodyPr rtlCol="0" anchor="ctr"/>
-          <a:lstStyle/>
-          <a:p>
-            <a:r>
-              <a:rPr lang="en-US" sz="1400" dirty="0">
-                <a:solidFill>
-                  <a:schemeClr val="bg1"/>
-                </a:solidFill>
-              </a:rPr>
-              <a:t>Currently Bidding</a:t>
-            </a:r>
-            <a:endParaRPr lang="en-IN" sz="1400" dirty="0">
-              <a:solidFill>
-                <a:schemeClr val="bg1"/>
-              </a:solidFill>
-            </a:endParaRPr>
-          </a:p>
-        </p:txBody>
-      </p:sp>
-      <p:sp>
-        <p:nvSpPr>
-          <p:cNvPr id="75" name="TextBox 74">
-            <a:extLst>
-              <a:ext uri="{FF2B5EF4-FFF2-40B4-BE49-F238E27FC236}">
-                <a16:creationId xmlns:a16="http://schemas.microsoft.com/office/drawing/2014/main" id="{8710848E-5829-4D5B-8EC7-4AD40BC3038B}"/>
+          <p:cNvPr id="17" name="TextBox 16">
+            <a:extLst>
+              <a:ext uri="{FF2B5EF4-FFF2-40B4-BE49-F238E27FC236}">
+                <a16:creationId xmlns:a16="http://schemas.microsoft.com/office/drawing/2014/main" id="{84873588-0186-4922-AAEA-FFF3291532AC}"/>
               </a:ext>
             </a:extLst>
           </p:cNvPr>
@@ -9220,8 +7666,8 @@
         </p:nvSpPr>
         <p:spPr>
           <a:xfrm>
-            <a:off x="9652564" y="9221117"/>
-            <a:ext cx="364202" cy="523220"/>
+            <a:off x="6413998" y="5887495"/>
+            <a:ext cx="820033" cy="276999"/>
           </a:xfrm>
           <a:prstGeom prst="rect">
             <a:avLst/>
@@ -9235,25 +7681,110 @@
           <a:lstStyle/>
           <a:p>
             <a:r>
-              <a:rPr lang="en-US" sz="2800" dirty="0">
+              <a:rPr lang="en-US" sz="1200" b="1" dirty="0">
                 <a:solidFill>
-                  <a:schemeClr val="bg1"/>
+                  <a:srgbClr val="0070C0"/>
                 </a:solidFill>
               </a:rPr>
-              <a:t>+</a:t>
-            </a:r>
-            <a:endParaRPr lang="en-IN" sz="2800" dirty="0">
+              <a:t>LESS INFO</a:t>
+            </a:r>
+            <a:endParaRPr lang="en-IN" sz="1200" b="1" dirty="0">
               <a:solidFill>
-                <a:schemeClr val="bg1"/>
+                <a:srgbClr val="0070C0"/>
               </a:solidFill>
             </a:endParaRPr>
+          </a:p>
+        </p:txBody>
+      </p:sp>
+      <p:sp>
+        <p:nvSpPr>
+          <p:cNvPr id="18" name="TextBox 17">
+            <a:extLst>
+              <a:ext uri="{FF2B5EF4-FFF2-40B4-BE49-F238E27FC236}">
+                <a16:creationId xmlns:a16="http://schemas.microsoft.com/office/drawing/2014/main" id="{98E6E3D5-FD56-4D51-B9B7-1352A6B3A4A6}"/>
+              </a:ext>
+            </a:extLst>
+          </p:cNvPr>
+          <p:cNvSpPr txBox="1"/>
+          <p:nvPr/>
+        </p:nvSpPr>
+        <p:spPr>
+          <a:xfrm>
+            <a:off x="6413998" y="5020341"/>
+            <a:ext cx="2327872" cy="276999"/>
+          </a:xfrm>
+          <a:prstGeom prst="rect">
+            <a:avLst/>
+          </a:prstGeom>
+          <a:noFill/>
+        </p:spPr>
+        <p:txBody>
+          <a:bodyPr wrap="square" rtlCol="0">
+            <a:spAutoFit/>
+          </a:bodyPr>
+          <a:lstStyle/>
+          <a:p>
+            <a:pPr algn="just"/>
+            <a:r>
+              <a:rPr lang="en-US" sz="1200" b="1" dirty="0"/>
+              <a:t>Deadline – </a:t>
+            </a:r>
+            <a:r>
+              <a:rPr lang="en-US" sz="1200" dirty="0"/>
+              <a:t>12/03/2020</a:t>
+            </a:r>
+            <a:endParaRPr lang="en-IN" sz="1200" dirty="0"/>
+          </a:p>
+        </p:txBody>
+      </p:sp>
+      <p:sp>
+        <p:nvSpPr>
+          <p:cNvPr id="19" name="TextBox 18">
+            <a:extLst>
+              <a:ext uri="{FF2B5EF4-FFF2-40B4-BE49-F238E27FC236}">
+                <a16:creationId xmlns:a16="http://schemas.microsoft.com/office/drawing/2014/main" id="{2A9E7004-F105-421E-9D69-70C156BE0115}"/>
+              </a:ext>
+            </a:extLst>
+          </p:cNvPr>
+          <p:cNvSpPr txBox="1"/>
+          <p:nvPr/>
+        </p:nvSpPr>
+        <p:spPr>
+          <a:xfrm>
+            <a:off x="6413998" y="5379696"/>
+            <a:ext cx="2327872" cy="461665"/>
+          </a:xfrm>
+          <a:prstGeom prst="rect">
+            <a:avLst/>
+          </a:prstGeom>
+          <a:noFill/>
+        </p:spPr>
+        <p:txBody>
+          <a:bodyPr wrap="square" rtlCol="0">
+            <a:spAutoFit/>
+          </a:bodyPr>
+          <a:lstStyle/>
+          <a:p>
+            <a:pPr algn="just"/>
+            <a:r>
+              <a:rPr lang="en-US" sz="1200" b="1" dirty="0"/>
+              <a:t>Current Highest Bidder</a:t>
+            </a:r>
+          </a:p>
+          <a:p>
+            <a:pPr algn="just"/>
+            <a:r>
+              <a:rPr lang="en-US" sz="1200" dirty="0"/>
+              <a:t>Name of person</a:t>
+            </a:r>
+            <a:endParaRPr lang="en-IN" sz="1200" dirty="0"/>
           </a:p>
         </p:txBody>
       </p:sp>
     </p:spTree>
     <p:extLst>
       <p:ext uri="{BB962C8B-B14F-4D97-AF65-F5344CB8AC3E}">
-        <p14:creationId xmlns:p14="http://schemas.microsoft.com/office/powerpoint/2010/main" val="4172842305"/>
+        <p14:creationId xmlns:p14="http://schemas.microsoft.com/office/powerpoint/2010/main" val="3155803658"/>
       </p:ext>
     </p:extLst>
   </p:cSld>
@@ -9282,10 +7813,10 @@
       </p:grpSpPr>
       <p:sp>
         <p:nvSpPr>
-          <p:cNvPr id="4" name="Rectangle: Rounded Corners 3">
-            <a:extLst>
-              <a:ext uri="{FF2B5EF4-FFF2-40B4-BE49-F238E27FC236}">
-                <a16:creationId xmlns:a16="http://schemas.microsoft.com/office/drawing/2014/main" id="{C5C7A4B6-C2D2-4FF1-B17A-730442036C48}"/>
+          <p:cNvPr id="2" name="Rectangle 1">
+            <a:extLst>
+              <a:ext uri="{FF2B5EF4-FFF2-40B4-BE49-F238E27FC236}">
+                <a16:creationId xmlns:a16="http://schemas.microsoft.com/office/drawing/2014/main" id="{9BDA3951-CA54-47CA-939D-D26565AA8068}"/>
               </a:ext>
             </a:extLst>
           </p:cNvPr>
@@ -9294,18 +7825,18 @@
         </p:nvSpPr>
         <p:spPr>
           <a:xfrm>
-            <a:off x="2932781" y="483549"/>
-            <a:ext cx="2750817" cy="4888201"/>
-          </a:xfrm>
-          <a:prstGeom prst="roundRect">
-            <a:avLst>
-              <a:gd name="adj" fmla="val 1543"/>
-            </a:avLst>
+            <a:off x="1" y="3959604"/>
+            <a:ext cx="12192000" cy="6568580"/>
+          </a:xfrm>
+          <a:prstGeom prst="rect">
+            <a:avLst/>
           </a:prstGeom>
           <a:solidFill>
-            <a:srgbClr val="F3F3F3"/>
+            <a:schemeClr val="bg1"/>
           </a:solidFill>
-          <a:ln w="28575"/>
+          <a:ln>
+            <a:noFill/>
+          </a:ln>
         </p:spPr>
         <p:style>
           <a:lnRef idx="2">
@@ -9334,10 +7865,71 @@
       </p:sp>
       <p:sp>
         <p:nvSpPr>
+          <p:cNvPr id="4" name="Rectangle 3">
+            <a:extLst>
+              <a:ext uri="{FF2B5EF4-FFF2-40B4-BE49-F238E27FC236}">
+                <a16:creationId xmlns:a16="http://schemas.microsoft.com/office/drawing/2014/main" id="{5DE535BE-9ECD-45F2-95A4-C4CB3266F8D3}"/>
+              </a:ext>
+            </a:extLst>
+          </p:cNvPr>
+          <p:cNvSpPr/>
+          <p:nvPr/>
+        </p:nvSpPr>
+        <p:spPr>
+          <a:xfrm>
+            <a:off x="0" y="1"/>
+            <a:ext cx="12192000" cy="813732"/>
+          </a:xfrm>
+          <a:prstGeom prst="rect">
+            <a:avLst/>
+          </a:prstGeom>
+          <a:solidFill>
+            <a:schemeClr val="bg1">
+              <a:lumMod val="95000"/>
+            </a:schemeClr>
+          </a:solidFill>
+          <a:ln>
+            <a:noFill/>
+          </a:ln>
+          <a:effectLst>
+            <a:outerShdw blurRad="50800" dist="38100" dir="5400000" algn="t" rotWithShape="0">
+              <a:prstClr val="black">
+                <a:alpha val="40000"/>
+              </a:prstClr>
+            </a:outerShdw>
+          </a:effectLst>
+        </p:spPr>
+        <p:style>
+          <a:lnRef idx="2">
+            <a:schemeClr val="accent1">
+              <a:shade val="50000"/>
+            </a:schemeClr>
+          </a:lnRef>
+          <a:fillRef idx="1">
+            <a:schemeClr val="accent1"/>
+          </a:fillRef>
+          <a:effectRef idx="0">
+            <a:schemeClr val="accent1"/>
+          </a:effectRef>
+          <a:fontRef idx="minor">
+            <a:schemeClr val="lt1"/>
+          </a:fontRef>
+        </p:style>
+        <p:txBody>
+          <a:bodyPr rtlCol="0" anchor="ctr"/>
+          <a:lstStyle/>
+          <a:p>
+            <a:pPr algn="ctr"/>
+            <a:endParaRPr lang="en-IN" dirty="0"/>
+          </a:p>
+        </p:txBody>
+      </p:sp>
+      <p:sp>
+        <p:nvSpPr>
           <p:cNvPr id="5" name="TextBox 4">
             <a:extLst>
               <a:ext uri="{FF2B5EF4-FFF2-40B4-BE49-F238E27FC236}">
-                <a16:creationId xmlns:a16="http://schemas.microsoft.com/office/drawing/2014/main" id="{5E1D5CBA-727D-45FF-AFBF-00A5390C2398}"/>
+                <a16:creationId xmlns:a16="http://schemas.microsoft.com/office/drawing/2014/main" id="{C9C1B364-E904-4F0B-A1D2-754FA88C4CCF}"/>
               </a:ext>
             </a:extLst>
           </p:cNvPr>
@@ -9346,8 +7938,8 @@
         </p:nvSpPr>
         <p:spPr>
           <a:xfrm>
-            <a:off x="3079263" y="640735"/>
-            <a:ext cx="1228926" cy="369332"/>
+            <a:off x="285226" y="222200"/>
+            <a:ext cx="3341236" cy="461665"/>
           </a:xfrm>
           <a:prstGeom prst="rect">
             <a:avLst/>
@@ -9361,6 +7953,270 @@
           <a:lstStyle/>
           <a:p>
             <a:r>
+              <a:rPr lang="en-US" sz="2400" b="1" dirty="0">
+                <a:latin typeface="Adobe Garamond Pro" panose="02020502060506020403" pitchFamily="18" charset="0"/>
+                <a:cs typeface="Aldhabi" panose="020B0604020202020204" pitchFamily="2" charset="-78"/>
+              </a:rPr>
+              <a:t>NITK AUCTIONS APP</a:t>
+            </a:r>
+            <a:endParaRPr lang="en-IN" sz="2400" b="1" dirty="0">
+              <a:latin typeface="Adobe Garamond Pro" panose="02020502060506020403" pitchFamily="18" charset="0"/>
+              <a:cs typeface="Aldhabi" panose="020B0604020202020204" pitchFamily="2" charset="-78"/>
+            </a:endParaRPr>
+          </a:p>
+        </p:txBody>
+      </p:sp>
+      <p:sp>
+        <p:nvSpPr>
+          <p:cNvPr id="6" name="TextBox 5">
+            <a:extLst>
+              <a:ext uri="{FF2B5EF4-FFF2-40B4-BE49-F238E27FC236}">
+                <a16:creationId xmlns:a16="http://schemas.microsoft.com/office/drawing/2014/main" id="{52646405-D68B-48FB-8196-A81398C0911F}"/>
+              </a:ext>
+            </a:extLst>
+          </p:cNvPr>
+          <p:cNvSpPr txBox="1"/>
+          <p:nvPr/>
+        </p:nvSpPr>
+        <p:spPr>
+          <a:xfrm>
+            <a:off x="11074495" y="222200"/>
+            <a:ext cx="832279" cy="369332"/>
+          </a:xfrm>
+          <a:prstGeom prst="rect">
+            <a:avLst/>
+          </a:prstGeom>
+          <a:noFill/>
+        </p:spPr>
+        <p:txBody>
+          <a:bodyPr wrap="none" rtlCol="0">
+            <a:spAutoFit/>
+          </a:bodyPr>
+          <a:lstStyle/>
+          <a:p>
+            <a:r>
+              <a:rPr lang="en-US" dirty="0">
+                <a:solidFill>
+                  <a:schemeClr val="tx1">
+                    <a:lumMod val="50000"/>
+                    <a:lumOff val="50000"/>
+                  </a:schemeClr>
+                </a:solidFill>
+              </a:rPr>
+              <a:t>Logout</a:t>
+            </a:r>
+            <a:endParaRPr lang="en-IN" dirty="0">
+              <a:solidFill>
+                <a:schemeClr val="tx1">
+                  <a:lumMod val="50000"/>
+                  <a:lumOff val="50000"/>
+                </a:schemeClr>
+              </a:solidFill>
+            </a:endParaRPr>
+          </a:p>
+        </p:txBody>
+      </p:sp>
+      <p:sp>
+        <p:nvSpPr>
+          <p:cNvPr id="7" name="TextBox 6">
+            <a:extLst>
+              <a:ext uri="{FF2B5EF4-FFF2-40B4-BE49-F238E27FC236}">
+                <a16:creationId xmlns:a16="http://schemas.microsoft.com/office/drawing/2014/main" id="{4C4EE17E-7AFC-4080-B315-3588F9D98004}"/>
+              </a:ext>
+            </a:extLst>
+          </p:cNvPr>
+          <p:cNvSpPr txBox="1"/>
+          <p:nvPr/>
+        </p:nvSpPr>
+        <p:spPr>
+          <a:xfrm>
+            <a:off x="9517594" y="222200"/>
+            <a:ext cx="1556901" cy="369332"/>
+          </a:xfrm>
+          <a:prstGeom prst="rect">
+            <a:avLst/>
+          </a:prstGeom>
+          <a:noFill/>
+        </p:spPr>
+        <p:txBody>
+          <a:bodyPr wrap="none" rtlCol="0">
+            <a:spAutoFit/>
+          </a:bodyPr>
+          <a:lstStyle/>
+          <a:p>
+            <a:r>
+              <a:rPr lang="en-US" u="sng" dirty="0"/>
+              <a:t>My Dashboard</a:t>
+            </a:r>
+            <a:endParaRPr lang="en-IN" u="sng" dirty="0"/>
+          </a:p>
+        </p:txBody>
+      </p:sp>
+      <p:sp>
+        <p:nvSpPr>
+          <p:cNvPr id="8" name="TextBox 7">
+            <a:extLst>
+              <a:ext uri="{FF2B5EF4-FFF2-40B4-BE49-F238E27FC236}">
+                <a16:creationId xmlns:a16="http://schemas.microsoft.com/office/drawing/2014/main" id="{DEF4271A-832A-42A3-97B0-D25E0DDC9C8C}"/>
+              </a:ext>
+            </a:extLst>
+          </p:cNvPr>
+          <p:cNvSpPr txBox="1"/>
+          <p:nvPr/>
+        </p:nvSpPr>
+        <p:spPr>
+          <a:xfrm>
+            <a:off x="7535898" y="222200"/>
+            <a:ext cx="1981696" cy="369332"/>
+          </a:xfrm>
+          <a:prstGeom prst="rect">
+            <a:avLst/>
+          </a:prstGeom>
+          <a:noFill/>
+        </p:spPr>
+        <p:txBody>
+          <a:bodyPr wrap="none" rtlCol="0">
+            <a:spAutoFit/>
+          </a:bodyPr>
+          <a:lstStyle/>
+          <a:p>
+            <a:r>
+              <a:rPr lang="en-US" dirty="0">
+                <a:solidFill>
+                  <a:schemeClr val="tx1">
+                    <a:lumMod val="50000"/>
+                    <a:lumOff val="50000"/>
+                  </a:schemeClr>
+                </a:solidFill>
+              </a:rPr>
+              <a:t>Auction Dashboard</a:t>
+            </a:r>
+          </a:p>
+        </p:txBody>
+      </p:sp>
+      <p:sp>
+        <p:nvSpPr>
+          <p:cNvPr id="9" name="TextBox 8">
+            <a:extLst>
+              <a:ext uri="{FF2B5EF4-FFF2-40B4-BE49-F238E27FC236}">
+                <a16:creationId xmlns:a16="http://schemas.microsoft.com/office/drawing/2014/main" id="{EDD590ED-775F-4DF6-9FA9-0D06E26CCA70}"/>
+              </a:ext>
+            </a:extLst>
+          </p:cNvPr>
+          <p:cNvSpPr txBox="1"/>
+          <p:nvPr/>
+        </p:nvSpPr>
+        <p:spPr>
+          <a:xfrm>
+            <a:off x="6489714" y="222200"/>
+            <a:ext cx="1046184" cy="369332"/>
+          </a:xfrm>
+          <a:prstGeom prst="rect">
+            <a:avLst/>
+          </a:prstGeom>
+          <a:noFill/>
+        </p:spPr>
+        <p:txBody>
+          <a:bodyPr wrap="none" rtlCol="0">
+            <a:spAutoFit/>
+          </a:bodyPr>
+          <a:lstStyle/>
+          <a:p>
+            <a:r>
+              <a:rPr lang="en-US" dirty="0">
+                <a:solidFill>
+                  <a:schemeClr val="tx1">
+                    <a:lumMod val="50000"/>
+                    <a:lumOff val="50000"/>
+                  </a:schemeClr>
+                </a:solidFill>
+              </a:rPr>
+              <a:t>Add Item</a:t>
+            </a:r>
+          </a:p>
+        </p:txBody>
+      </p:sp>
+      <p:sp>
+        <p:nvSpPr>
+          <p:cNvPr id="24" name="Rectangle: Rounded Corners 23">
+            <a:extLst>
+              <a:ext uri="{FF2B5EF4-FFF2-40B4-BE49-F238E27FC236}">
+                <a16:creationId xmlns:a16="http://schemas.microsoft.com/office/drawing/2014/main" id="{497FBC6B-9C10-4BE9-8346-8113506ED0A7}"/>
+              </a:ext>
+            </a:extLst>
+          </p:cNvPr>
+          <p:cNvSpPr/>
+          <p:nvPr/>
+        </p:nvSpPr>
+        <p:spPr>
+          <a:xfrm>
+            <a:off x="1617682" y="2052292"/>
+            <a:ext cx="2750817" cy="3291496"/>
+          </a:xfrm>
+          <a:prstGeom prst="roundRect">
+            <a:avLst>
+              <a:gd name="adj" fmla="val 1543"/>
+            </a:avLst>
+          </a:prstGeom>
+          <a:solidFill>
+            <a:srgbClr val="F3F3F3"/>
+          </a:solidFill>
+          <a:ln w="28575"/>
+        </p:spPr>
+        <p:style>
+          <a:lnRef idx="2">
+            <a:schemeClr val="accent1">
+              <a:shade val="50000"/>
+            </a:schemeClr>
+          </a:lnRef>
+          <a:fillRef idx="1">
+            <a:schemeClr val="accent1"/>
+          </a:fillRef>
+          <a:effectRef idx="0">
+            <a:schemeClr val="accent1"/>
+          </a:effectRef>
+          <a:fontRef idx="minor">
+            <a:schemeClr val="lt1"/>
+          </a:fontRef>
+        </p:style>
+        <p:txBody>
+          <a:bodyPr rtlCol="0" anchor="ctr"/>
+          <a:lstStyle/>
+          <a:p>
+            <a:pPr algn="ctr"/>
+            <a:endParaRPr lang="en-IN" dirty="0"/>
+          </a:p>
+        </p:txBody>
+      </p:sp>
+      <p:sp>
+        <p:nvSpPr>
+          <p:cNvPr id="25" name="TextBox 24">
+            <a:extLst>
+              <a:ext uri="{FF2B5EF4-FFF2-40B4-BE49-F238E27FC236}">
+                <a16:creationId xmlns:a16="http://schemas.microsoft.com/office/drawing/2014/main" id="{38AC78F3-6418-4B65-92CD-CD1E1F681F46}"/>
+              </a:ext>
+            </a:extLst>
+          </p:cNvPr>
+          <p:cNvSpPr txBox="1"/>
+          <p:nvPr/>
+        </p:nvSpPr>
+        <p:spPr>
+          <a:xfrm>
+            <a:off x="1764164" y="2209477"/>
+            <a:ext cx="1228926" cy="369332"/>
+          </a:xfrm>
+          <a:prstGeom prst="rect">
+            <a:avLst/>
+          </a:prstGeom>
+          <a:noFill/>
+        </p:spPr>
+        <p:txBody>
+          <a:bodyPr wrap="none" rtlCol="0">
+            <a:spAutoFit/>
+          </a:bodyPr>
+          <a:lstStyle/>
+          <a:p>
+            <a:r>
               <a:rPr lang="en-US" dirty="0"/>
               <a:t>Item Name</a:t>
             </a:r>
@@ -9370,10 +8226,10 @@
       </p:sp>
       <p:sp>
         <p:nvSpPr>
-          <p:cNvPr id="6" name="Rectangle: Rounded Corners 5">
-            <a:extLst>
-              <a:ext uri="{FF2B5EF4-FFF2-40B4-BE49-F238E27FC236}">
-                <a16:creationId xmlns:a16="http://schemas.microsoft.com/office/drawing/2014/main" id="{BF205299-41DD-4891-8B32-E035679EB84F}"/>
+          <p:cNvPr id="26" name="Rectangle: Rounded Corners 25">
+            <a:extLst>
+              <a:ext uri="{FF2B5EF4-FFF2-40B4-BE49-F238E27FC236}">
+                <a16:creationId xmlns:a16="http://schemas.microsoft.com/office/drawing/2014/main" id="{A631FC8E-2821-4AF2-8C84-96EF8E872C49}"/>
               </a:ext>
             </a:extLst>
           </p:cNvPr>
@@ -9382,7 +8238,7 @@
         </p:nvSpPr>
         <p:spPr>
           <a:xfrm>
-            <a:off x="3144253" y="1167252"/>
+            <a:off x="1829154" y="2735994"/>
             <a:ext cx="2327872" cy="2371720"/>
           </a:xfrm>
           <a:prstGeom prst="roundRect">
@@ -9440,54 +8296,10 @@
       </p:sp>
       <p:sp>
         <p:nvSpPr>
-          <p:cNvPr id="7" name="TextBox 6">
-            <a:extLst>
-              <a:ext uri="{FF2B5EF4-FFF2-40B4-BE49-F238E27FC236}">
-                <a16:creationId xmlns:a16="http://schemas.microsoft.com/office/drawing/2014/main" id="{D4258EF9-4521-4AA0-878D-FD0F0BF6BDE3}"/>
-              </a:ext>
-            </a:extLst>
-          </p:cNvPr>
-          <p:cNvSpPr txBox="1"/>
-          <p:nvPr/>
-        </p:nvSpPr>
-        <p:spPr>
-          <a:xfrm>
-            <a:off x="3144253" y="3742564"/>
-            <a:ext cx="2327872" cy="1200329"/>
-          </a:xfrm>
-          <a:prstGeom prst="rect">
-            <a:avLst/>
-          </a:prstGeom>
-          <a:noFill/>
-        </p:spPr>
-        <p:txBody>
-          <a:bodyPr wrap="square" rtlCol="0">
-            <a:spAutoFit/>
-          </a:bodyPr>
-          <a:lstStyle/>
-          <a:p>
-            <a:pPr algn="just"/>
-            <a:r>
-              <a:rPr lang="en-US" sz="1200" b="1" dirty="0"/>
-              <a:t>Item Description </a:t>
-            </a:r>
-            <a:r>
-              <a:rPr lang="en-US" sz="1200" dirty="0"/>
-              <a:t>– </a:t>
-            </a:r>
-            <a:r>
-              <a:rPr lang="en-IN" sz="1200" dirty="0"/>
-              <a:t>Lorem ipsum dolor sit amet, fvfvfv consectetur adipiscing cvfvfv elit. Suspendisse aliquam pretium ex vitae laoreet. Etiam orci est, dapibus et posuere sit amet, posuere quis dui.</a:t>
-            </a:r>
-          </a:p>
-        </p:txBody>
-      </p:sp>
-      <p:sp>
-        <p:nvSpPr>
-          <p:cNvPr id="8" name="Rectangle: Rounded Corners 7">
-            <a:extLst>
-              <a:ext uri="{FF2B5EF4-FFF2-40B4-BE49-F238E27FC236}">
-                <a16:creationId xmlns:a16="http://schemas.microsoft.com/office/drawing/2014/main" id="{3CF6EFC3-E825-4478-ACAF-917F7A361A93}"/>
+          <p:cNvPr id="28" name="Rectangle: Rounded Corners 27">
+            <a:extLst>
+              <a:ext uri="{FF2B5EF4-FFF2-40B4-BE49-F238E27FC236}">
+                <a16:creationId xmlns:a16="http://schemas.microsoft.com/office/drawing/2014/main" id="{0A54A31B-6CE5-4EFD-9E36-BD4E5D5F98C0}"/>
               </a:ext>
             </a:extLst>
           </p:cNvPr>
@@ -9496,7 +8308,7 @@
         </p:nvSpPr>
         <p:spPr>
           <a:xfrm>
-            <a:off x="3144252" y="3011864"/>
+            <a:off x="1829153" y="4580606"/>
             <a:ext cx="2327874" cy="527108"/>
           </a:xfrm>
           <a:prstGeom prst="roundRect">
@@ -9536,7 +8348,7 @@
                   <a:schemeClr val="bg1"/>
                 </a:solidFill>
               </a:rPr>
-              <a:t>Current Bid</a:t>
+              <a:t>Claim Now</a:t>
             </a:r>
             <a:endParaRPr lang="en-IN" sz="1400" dirty="0">
               <a:solidFill>
@@ -9548,10 +8360,10 @@
       </p:sp>
       <p:sp>
         <p:nvSpPr>
-          <p:cNvPr id="9" name="TextBox 8">
-            <a:extLst>
-              <a:ext uri="{FF2B5EF4-FFF2-40B4-BE49-F238E27FC236}">
-                <a16:creationId xmlns:a16="http://schemas.microsoft.com/office/drawing/2014/main" id="{427F8F30-B235-4648-A014-F37432D8F00A}"/>
+          <p:cNvPr id="29" name="TextBox 28">
+            <a:extLst>
+              <a:ext uri="{FF2B5EF4-FFF2-40B4-BE49-F238E27FC236}">
+                <a16:creationId xmlns:a16="http://schemas.microsoft.com/office/drawing/2014/main" id="{63B01B59-6AC7-4BF4-9668-6BE02196A0B1}"/>
               </a:ext>
             </a:extLst>
           </p:cNvPr>
@@ -9560,8 +8372,8 @@
         </p:nvSpPr>
         <p:spPr>
           <a:xfrm>
-            <a:off x="5049449" y="3011864"/>
-            <a:ext cx="364202" cy="523220"/>
+            <a:off x="3724487" y="4671753"/>
+            <a:ext cx="357790" cy="369332"/>
           </a:xfrm>
           <a:prstGeom prst="rect">
             <a:avLst/>
@@ -9575,71 +8387,22 @@
           <a:lstStyle/>
           <a:p>
             <a:r>
-              <a:rPr lang="en-US" sz="2800" dirty="0">
+              <a:rPr lang="en-IN" b="1" dirty="0">
                 <a:solidFill>
                   <a:schemeClr val="bg1"/>
                 </a:solidFill>
               </a:rPr>
-              <a:t>+</a:t>
-            </a:r>
-            <a:endParaRPr lang="en-IN" sz="2800" dirty="0">
-              <a:solidFill>
-                <a:schemeClr val="bg1"/>
-              </a:solidFill>
-            </a:endParaRPr>
-          </a:p>
-        </p:txBody>
-      </p:sp>
-      <p:sp>
-        <p:nvSpPr>
-          <p:cNvPr id="10" name="TextBox 9">
-            <a:extLst>
-              <a:ext uri="{FF2B5EF4-FFF2-40B4-BE49-F238E27FC236}">
-                <a16:creationId xmlns:a16="http://schemas.microsoft.com/office/drawing/2014/main" id="{E7DD55BD-BE2A-42F0-98C0-EAE0C793214B}"/>
-              </a:ext>
-            </a:extLst>
-          </p:cNvPr>
-          <p:cNvSpPr txBox="1"/>
-          <p:nvPr/>
-        </p:nvSpPr>
-        <p:spPr>
-          <a:xfrm>
-            <a:off x="3141072" y="4961876"/>
-            <a:ext cx="936923" cy="276999"/>
-          </a:xfrm>
-          <a:prstGeom prst="rect">
-            <a:avLst/>
-          </a:prstGeom>
-          <a:noFill/>
-        </p:spPr>
-        <p:txBody>
-          <a:bodyPr wrap="none" rtlCol="0">
-            <a:spAutoFit/>
-          </a:bodyPr>
-          <a:lstStyle/>
-          <a:p>
-            <a:r>
-              <a:rPr lang="en-US" sz="1200" b="1" dirty="0">
-                <a:solidFill>
-                  <a:srgbClr val="0070C0"/>
-                </a:solidFill>
-              </a:rPr>
-              <a:t>MORE INFO</a:t>
-            </a:r>
-            <a:endParaRPr lang="en-IN" sz="1200" b="1" dirty="0">
-              <a:solidFill>
-                <a:srgbClr val="0070C0"/>
-              </a:solidFill>
-            </a:endParaRPr>
-          </a:p>
-        </p:txBody>
-      </p:sp>
-      <p:sp>
-        <p:nvSpPr>
-          <p:cNvPr id="11" name="Rectangle: Rounded Corners 10">
-            <a:extLst>
-              <a:ext uri="{FF2B5EF4-FFF2-40B4-BE49-F238E27FC236}">
-                <a16:creationId xmlns:a16="http://schemas.microsoft.com/office/drawing/2014/main" id="{8B564E93-A2D7-43D1-A5DC-62E930CF6390}"/>
+              <a:t>✓</a:t>
+            </a:r>
+          </a:p>
+        </p:txBody>
+      </p:sp>
+      <p:sp>
+        <p:nvSpPr>
+          <p:cNvPr id="31" name="Rectangle: Rounded Corners 30">
+            <a:extLst>
+              <a:ext uri="{FF2B5EF4-FFF2-40B4-BE49-F238E27FC236}">
+                <a16:creationId xmlns:a16="http://schemas.microsoft.com/office/drawing/2014/main" id="{220CBE65-9688-4F4C-8EC1-0E418D19BFC8}"/>
               </a:ext>
             </a:extLst>
           </p:cNvPr>
@@ -9648,8 +8411,8 @@
         </p:nvSpPr>
         <p:spPr>
           <a:xfrm>
-            <a:off x="6202527" y="483549"/>
-            <a:ext cx="2750817" cy="5791416"/>
+            <a:off x="4576790" y="2052292"/>
+            <a:ext cx="2750817" cy="3291496"/>
           </a:xfrm>
           <a:prstGeom prst="roundRect">
             <a:avLst>
@@ -9688,10 +8451,10 @@
       </p:sp>
       <p:sp>
         <p:nvSpPr>
-          <p:cNvPr id="12" name="TextBox 11">
-            <a:extLst>
-              <a:ext uri="{FF2B5EF4-FFF2-40B4-BE49-F238E27FC236}">
-                <a16:creationId xmlns:a16="http://schemas.microsoft.com/office/drawing/2014/main" id="{573DBCFE-5D1B-4D63-91E7-D362FCF0952A}"/>
+          <p:cNvPr id="32" name="TextBox 31">
+            <a:extLst>
+              <a:ext uri="{FF2B5EF4-FFF2-40B4-BE49-F238E27FC236}">
+                <a16:creationId xmlns:a16="http://schemas.microsoft.com/office/drawing/2014/main" id="{BD8212A3-0A1C-40F8-8B1D-35375383BDA4}"/>
               </a:ext>
             </a:extLst>
           </p:cNvPr>
@@ -9700,7 +8463,7 @@
         </p:nvSpPr>
         <p:spPr>
           <a:xfrm>
-            <a:off x="6349009" y="640735"/>
+            <a:off x="4723272" y="2209477"/>
             <a:ext cx="1228926" cy="369332"/>
           </a:xfrm>
           <a:prstGeom prst="rect">
@@ -9724,10 +8487,10 @@
       </p:sp>
       <p:sp>
         <p:nvSpPr>
-          <p:cNvPr id="13" name="Rectangle: Rounded Corners 12">
-            <a:extLst>
-              <a:ext uri="{FF2B5EF4-FFF2-40B4-BE49-F238E27FC236}">
-                <a16:creationId xmlns:a16="http://schemas.microsoft.com/office/drawing/2014/main" id="{58C9E709-BD16-4F4B-8062-19524D25B801}"/>
+          <p:cNvPr id="33" name="Rectangle: Rounded Corners 32">
+            <a:extLst>
+              <a:ext uri="{FF2B5EF4-FFF2-40B4-BE49-F238E27FC236}">
+                <a16:creationId xmlns:a16="http://schemas.microsoft.com/office/drawing/2014/main" id="{1E3949CD-2650-4D6B-B352-C795D217BF27}"/>
               </a:ext>
             </a:extLst>
           </p:cNvPr>
@@ -9736,7 +8499,7 @@
         </p:nvSpPr>
         <p:spPr>
           <a:xfrm>
-            <a:off x="6413999" y="1167252"/>
+            <a:off x="4788262" y="2735994"/>
             <a:ext cx="2327872" cy="2371720"/>
           </a:xfrm>
           <a:prstGeom prst="roundRect">
@@ -9794,54 +8557,10 @@
       </p:sp>
       <p:sp>
         <p:nvSpPr>
-          <p:cNvPr id="14" name="TextBox 13">
-            <a:extLst>
-              <a:ext uri="{FF2B5EF4-FFF2-40B4-BE49-F238E27FC236}">
-                <a16:creationId xmlns:a16="http://schemas.microsoft.com/office/drawing/2014/main" id="{91546BCC-FA5B-4DA4-9D43-18C7FB99B4D5}"/>
-              </a:ext>
-            </a:extLst>
-          </p:cNvPr>
-          <p:cNvSpPr txBox="1"/>
-          <p:nvPr/>
-        </p:nvSpPr>
-        <p:spPr>
-          <a:xfrm>
-            <a:off x="6413999" y="3742564"/>
-            <a:ext cx="2327872" cy="1200329"/>
-          </a:xfrm>
-          <a:prstGeom prst="rect">
-            <a:avLst/>
-          </a:prstGeom>
-          <a:noFill/>
-        </p:spPr>
-        <p:txBody>
-          <a:bodyPr wrap="square" rtlCol="0">
-            <a:spAutoFit/>
-          </a:bodyPr>
-          <a:lstStyle/>
-          <a:p>
-            <a:pPr algn="just"/>
-            <a:r>
-              <a:rPr lang="en-US" sz="1200" b="1" dirty="0"/>
-              <a:t>Item Description </a:t>
-            </a:r>
-            <a:r>
-              <a:rPr lang="en-US" sz="1200" dirty="0"/>
-              <a:t>– </a:t>
-            </a:r>
-            <a:r>
-              <a:rPr lang="en-IN" sz="1200" dirty="0"/>
-              <a:t>Lorem ipsum dolor sit amet, fvfvfv consectetur adipiscing cvfvfv elit. Suspendisse aliquam pretium ex vitae laoreet. Etiam orci est, dapibus et posuere sit amet, posuere quis dui.</a:t>
-            </a:r>
-          </a:p>
-        </p:txBody>
-      </p:sp>
-      <p:sp>
-        <p:nvSpPr>
-          <p:cNvPr id="15" name="Rectangle: Rounded Corners 14">
-            <a:extLst>
-              <a:ext uri="{FF2B5EF4-FFF2-40B4-BE49-F238E27FC236}">
-                <a16:creationId xmlns:a16="http://schemas.microsoft.com/office/drawing/2014/main" id="{AFF9747C-6A45-48DD-9A60-F73B36C7AADD}"/>
+          <p:cNvPr id="35" name="Rectangle: Rounded Corners 34">
+            <a:extLst>
+              <a:ext uri="{FF2B5EF4-FFF2-40B4-BE49-F238E27FC236}">
+                <a16:creationId xmlns:a16="http://schemas.microsoft.com/office/drawing/2014/main" id="{F2F790D8-C5D0-4E11-9F29-523B5311266F}"/>
               </a:ext>
             </a:extLst>
           </p:cNvPr>
@@ -9850,7 +8569,7 @@
         </p:nvSpPr>
         <p:spPr>
           <a:xfrm>
-            <a:off x="6413998" y="3011864"/>
+            <a:off x="4788261" y="4580606"/>
             <a:ext cx="2327874" cy="527108"/>
           </a:xfrm>
           <a:prstGeom prst="roundRect">
@@ -9890,7 +8609,7 @@
                   <a:schemeClr val="bg1"/>
                 </a:solidFill>
               </a:rPr>
-              <a:t>Current Bid</a:t>
+              <a:t>Claim Now</a:t>
             </a:r>
             <a:endParaRPr lang="en-IN" sz="1400" dirty="0">
               <a:solidFill>
@@ -9902,10 +8621,62 @@
       </p:sp>
       <p:sp>
         <p:nvSpPr>
-          <p:cNvPr id="16" name="TextBox 15">
-            <a:extLst>
-              <a:ext uri="{FF2B5EF4-FFF2-40B4-BE49-F238E27FC236}">
-                <a16:creationId xmlns:a16="http://schemas.microsoft.com/office/drawing/2014/main" id="{8892E6A3-9B4D-48A9-8B80-B2B67776E308}"/>
+          <p:cNvPr id="38" name="Rectangle: Rounded Corners 37">
+            <a:extLst>
+              <a:ext uri="{FF2B5EF4-FFF2-40B4-BE49-F238E27FC236}">
+                <a16:creationId xmlns:a16="http://schemas.microsoft.com/office/drawing/2014/main" id="{BA92E668-F26D-428C-BB17-CF23E219E10B}"/>
+              </a:ext>
+            </a:extLst>
+          </p:cNvPr>
+          <p:cNvSpPr/>
+          <p:nvPr/>
+        </p:nvSpPr>
+        <p:spPr>
+          <a:xfrm>
+            <a:off x="7535898" y="2052292"/>
+            <a:ext cx="2750817" cy="3291496"/>
+          </a:xfrm>
+          <a:prstGeom prst="roundRect">
+            <a:avLst>
+              <a:gd name="adj" fmla="val 1543"/>
+            </a:avLst>
+          </a:prstGeom>
+          <a:solidFill>
+            <a:srgbClr val="F3F3F3"/>
+          </a:solidFill>
+          <a:ln w="28575"/>
+        </p:spPr>
+        <p:style>
+          <a:lnRef idx="2">
+            <a:schemeClr val="accent1">
+              <a:shade val="50000"/>
+            </a:schemeClr>
+          </a:lnRef>
+          <a:fillRef idx="1">
+            <a:schemeClr val="accent1"/>
+          </a:fillRef>
+          <a:effectRef idx="0">
+            <a:schemeClr val="accent1"/>
+          </a:effectRef>
+          <a:fontRef idx="minor">
+            <a:schemeClr val="lt1"/>
+          </a:fontRef>
+        </p:style>
+        <p:txBody>
+          <a:bodyPr rtlCol="0" anchor="ctr"/>
+          <a:lstStyle/>
+          <a:p>
+            <a:pPr algn="ctr"/>
+            <a:endParaRPr lang="en-IN" dirty="0"/>
+          </a:p>
+        </p:txBody>
+      </p:sp>
+      <p:sp>
+        <p:nvSpPr>
+          <p:cNvPr id="39" name="TextBox 38">
+            <a:extLst>
+              <a:ext uri="{FF2B5EF4-FFF2-40B4-BE49-F238E27FC236}">
+                <a16:creationId xmlns:a16="http://schemas.microsoft.com/office/drawing/2014/main" id="{6FEBA26E-0B5D-4A69-8446-E06BD592889C}"/>
               </a:ext>
             </a:extLst>
           </p:cNvPr>
@@ -9914,7 +8685,1257 @@
         </p:nvSpPr>
         <p:spPr>
           <a:xfrm>
-            <a:off x="8319195" y="3011864"/>
+            <a:off x="7682380" y="2209477"/>
+            <a:ext cx="1228926" cy="369332"/>
+          </a:xfrm>
+          <a:prstGeom prst="rect">
+            <a:avLst/>
+          </a:prstGeom>
+          <a:noFill/>
+        </p:spPr>
+        <p:txBody>
+          <a:bodyPr wrap="none" rtlCol="0">
+            <a:spAutoFit/>
+          </a:bodyPr>
+          <a:lstStyle/>
+          <a:p>
+            <a:r>
+              <a:rPr lang="en-US" dirty="0"/>
+              <a:t>Item Name</a:t>
+            </a:r>
+            <a:endParaRPr lang="en-IN" dirty="0"/>
+          </a:p>
+        </p:txBody>
+      </p:sp>
+      <p:sp>
+        <p:nvSpPr>
+          <p:cNvPr id="40" name="Rectangle: Rounded Corners 39">
+            <a:extLst>
+              <a:ext uri="{FF2B5EF4-FFF2-40B4-BE49-F238E27FC236}">
+                <a16:creationId xmlns:a16="http://schemas.microsoft.com/office/drawing/2014/main" id="{98287C3F-26FF-485A-8614-DE29CCAC8BD2}"/>
+              </a:ext>
+            </a:extLst>
+          </p:cNvPr>
+          <p:cNvSpPr/>
+          <p:nvPr/>
+        </p:nvSpPr>
+        <p:spPr>
+          <a:xfrm>
+            <a:off x="7747370" y="2735994"/>
+            <a:ext cx="2327872" cy="2371720"/>
+          </a:xfrm>
+          <a:prstGeom prst="roundRect">
+            <a:avLst>
+              <a:gd name="adj" fmla="val 11213"/>
+            </a:avLst>
+          </a:prstGeom>
+          <a:solidFill>
+            <a:schemeClr val="bg1">
+              <a:lumMod val="95000"/>
+            </a:schemeClr>
+          </a:solidFill>
+          <a:ln w="28575"/>
+        </p:spPr>
+        <p:style>
+          <a:lnRef idx="2">
+            <a:schemeClr val="accent1">
+              <a:shade val="50000"/>
+            </a:schemeClr>
+          </a:lnRef>
+          <a:fillRef idx="1">
+            <a:schemeClr val="accent1"/>
+          </a:fillRef>
+          <a:effectRef idx="0">
+            <a:schemeClr val="accent1"/>
+          </a:effectRef>
+          <a:fontRef idx="minor">
+            <a:schemeClr val="lt1"/>
+          </a:fontRef>
+        </p:style>
+        <p:txBody>
+          <a:bodyPr rtlCol="0" anchor="ctr"/>
+          <a:lstStyle/>
+          <a:p>
+            <a:pPr algn="ctr"/>
+            <a:r>
+              <a:rPr lang="en-US" dirty="0">
+                <a:solidFill>
+                  <a:schemeClr val="bg2">
+                    <a:lumMod val="75000"/>
+                  </a:schemeClr>
+                </a:solidFill>
+              </a:rPr>
+              <a:t>image</a:t>
+            </a:r>
+            <a:endParaRPr lang="en-IN" dirty="0">
+              <a:solidFill>
+                <a:schemeClr val="bg2">
+                  <a:lumMod val="75000"/>
+                </a:schemeClr>
+              </a:solidFill>
+            </a:endParaRPr>
+          </a:p>
+        </p:txBody>
+      </p:sp>
+      <p:sp>
+        <p:nvSpPr>
+          <p:cNvPr id="42" name="Rectangle: Rounded Corners 41">
+            <a:extLst>
+              <a:ext uri="{FF2B5EF4-FFF2-40B4-BE49-F238E27FC236}">
+                <a16:creationId xmlns:a16="http://schemas.microsoft.com/office/drawing/2014/main" id="{709D0231-F3EF-4DE7-8EA2-679F89CF48C1}"/>
+              </a:ext>
+            </a:extLst>
+          </p:cNvPr>
+          <p:cNvSpPr/>
+          <p:nvPr/>
+        </p:nvSpPr>
+        <p:spPr>
+          <a:xfrm>
+            <a:off x="7747369" y="4580606"/>
+            <a:ext cx="2327874" cy="527108"/>
+          </a:xfrm>
+          <a:prstGeom prst="roundRect">
+            <a:avLst>
+              <a:gd name="adj" fmla="val 50000"/>
+            </a:avLst>
+          </a:prstGeom>
+          <a:solidFill>
+            <a:schemeClr val="accent5">
+              <a:lumMod val="75000"/>
+            </a:schemeClr>
+          </a:solidFill>
+        </p:spPr>
+        <p:style>
+          <a:lnRef idx="2">
+            <a:schemeClr val="accent1">
+              <a:shade val="50000"/>
+            </a:schemeClr>
+          </a:lnRef>
+          <a:fillRef idx="1">
+            <a:schemeClr val="accent1"/>
+          </a:fillRef>
+          <a:effectRef idx="0">
+            <a:schemeClr val="accent1"/>
+          </a:effectRef>
+          <a:fontRef idx="minor">
+            <a:schemeClr val="lt1"/>
+          </a:fontRef>
+        </p:style>
+        <p:txBody>
+          <a:bodyPr rtlCol="0" anchor="ctr"/>
+          <a:lstStyle/>
+          <a:p>
+            <a:r>
+              <a:rPr lang="en-US" sz="1400" dirty="0">
+                <a:solidFill>
+                  <a:schemeClr val="bg1"/>
+                </a:solidFill>
+              </a:rPr>
+              <a:t>Claim Now</a:t>
+            </a:r>
+            <a:endParaRPr lang="en-IN" sz="1400" dirty="0">
+              <a:solidFill>
+                <a:schemeClr val="bg1"/>
+              </a:solidFill>
+            </a:endParaRPr>
+          </a:p>
+        </p:txBody>
+      </p:sp>
+      <p:sp>
+        <p:nvSpPr>
+          <p:cNvPr id="45" name="TextBox 44">
+            <a:extLst>
+              <a:ext uri="{FF2B5EF4-FFF2-40B4-BE49-F238E27FC236}">
+                <a16:creationId xmlns:a16="http://schemas.microsoft.com/office/drawing/2014/main" id="{C6BF6E2C-A56C-40EC-988D-A954DF1647A3}"/>
+              </a:ext>
+            </a:extLst>
+          </p:cNvPr>
+          <p:cNvSpPr txBox="1"/>
+          <p:nvPr/>
+        </p:nvSpPr>
+        <p:spPr>
+          <a:xfrm>
+            <a:off x="1617682" y="1415184"/>
+            <a:ext cx="3868367" cy="461665"/>
+          </a:xfrm>
+          <a:prstGeom prst="rect">
+            <a:avLst/>
+          </a:prstGeom>
+          <a:noFill/>
+        </p:spPr>
+        <p:txBody>
+          <a:bodyPr wrap="none" rtlCol="0">
+            <a:spAutoFit/>
+          </a:bodyPr>
+          <a:lstStyle/>
+          <a:p>
+            <a:r>
+              <a:rPr lang="en-US" sz="2400" b="1" dirty="0">
+                <a:latin typeface="Adobe Garamond Pro" panose="02020502060506020403" pitchFamily="18" charset="0"/>
+                <a:cs typeface="Aldhabi" panose="020B0604020202020204" pitchFamily="2" charset="-78"/>
+              </a:rPr>
+              <a:t>CLAIM YOUR BIDS HERE</a:t>
+            </a:r>
+            <a:endParaRPr lang="en-IN" sz="2400" b="1" dirty="0">
+              <a:latin typeface="Adobe Garamond Pro" panose="02020502060506020403" pitchFamily="18" charset="0"/>
+              <a:cs typeface="Aldhabi" panose="020B0604020202020204" pitchFamily="2" charset="-78"/>
+            </a:endParaRPr>
+          </a:p>
+        </p:txBody>
+      </p:sp>
+      <p:sp>
+        <p:nvSpPr>
+          <p:cNvPr id="46" name="TextBox 45">
+            <a:extLst>
+              <a:ext uri="{FF2B5EF4-FFF2-40B4-BE49-F238E27FC236}">
+                <a16:creationId xmlns:a16="http://schemas.microsoft.com/office/drawing/2014/main" id="{FBCB83F6-9634-4F47-AE9F-214F5B31173C}"/>
+              </a:ext>
+            </a:extLst>
+          </p:cNvPr>
+          <p:cNvSpPr txBox="1"/>
+          <p:nvPr/>
+        </p:nvSpPr>
+        <p:spPr>
+          <a:xfrm>
+            <a:off x="9644293" y="4671753"/>
+            <a:ext cx="357790" cy="369332"/>
+          </a:xfrm>
+          <a:prstGeom prst="rect">
+            <a:avLst/>
+          </a:prstGeom>
+          <a:noFill/>
+        </p:spPr>
+        <p:txBody>
+          <a:bodyPr wrap="none" rtlCol="0">
+            <a:spAutoFit/>
+          </a:bodyPr>
+          <a:lstStyle/>
+          <a:p>
+            <a:r>
+              <a:rPr lang="en-IN" b="1" dirty="0">
+                <a:solidFill>
+                  <a:schemeClr val="bg1"/>
+                </a:solidFill>
+              </a:rPr>
+              <a:t>✓</a:t>
+            </a:r>
+          </a:p>
+        </p:txBody>
+      </p:sp>
+      <p:sp>
+        <p:nvSpPr>
+          <p:cNvPr id="47" name="TextBox 46">
+            <a:extLst>
+              <a:ext uri="{FF2B5EF4-FFF2-40B4-BE49-F238E27FC236}">
+                <a16:creationId xmlns:a16="http://schemas.microsoft.com/office/drawing/2014/main" id="{F3ACCF22-C91D-457D-A987-04CBA2FE561F}"/>
+              </a:ext>
+            </a:extLst>
+          </p:cNvPr>
+          <p:cNvSpPr txBox="1"/>
+          <p:nvPr/>
+        </p:nvSpPr>
+        <p:spPr>
+          <a:xfrm>
+            <a:off x="6687389" y="4659494"/>
+            <a:ext cx="357790" cy="369332"/>
+          </a:xfrm>
+          <a:prstGeom prst="rect">
+            <a:avLst/>
+          </a:prstGeom>
+          <a:noFill/>
+        </p:spPr>
+        <p:txBody>
+          <a:bodyPr wrap="none" rtlCol="0">
+            <a:spAutoFit/>
+          </a:bodyPr>
+          <a:lstStyle/>
+          <a:p>
+            <a:r>
+              <a:rPr lang="en-IN" b="1" dirty="0">
+                <a:solidFill>
+                  <a:schemeClr val="bg1"/>
+                </a:solidFill>
+              </a:rPr>
+              <a:t>✓</a:t>
+            </a:r>
+          </a:p>
+        </p:txBody>
+      </p:sp>
+      <p:sp>
+        <p:nvSpPr>
+          <p:cNvPr id="48" name="Rectangle: Rounded Corners 47">
+            <a:extLst>
+              <a:ext uri="{FF2B5EF4-FFF2-40B4-BE49-F238E27FC236}">
+                <a16:creationId xmlns:a16="http://schemas.microsoft.com/office/drawing/2014/main" id="{189B4A8B-5CB8-414C-80DD-FF5673DED17C}"/>
+              </a:ext>
+            </a:extLst>
+          </p:cNvPr>
+          <p:cNvSpPr/>
+          <p:nvPr/>
+        </p:nvSpPr>
+        <p:spPr>
+          <a:xfrm>
+            <a:off x="1617681" y="6692803"/>
+            <a:ext cx="2750817" cy="3291496"/>
+          </a:xfrm>
+          <a:prstGeom prst="roundRect">
+            <a:avLst>
+              <a:gd name="adj" fmla="val 1543"/>
+            </a:avLst>
+          </a:prstGeom>
+          <a:solidFill>
+            <a:srgbClr val="F3F3F3"/>
+          </a:solidFill>
+          <a:ln w="28575"/>
+        </p:spPr>
+        <p:style>
+          <a:lnRef idx="2">
+            <a:schemeClr val="accent1">
+              <a:shade val="50000"/>
+            </a:schemeClr>
+          </a:lnRef>
+          <a:fillRef idx="1">
+            <a:schemeClr val="accent1"/>
+          </a:fillRef>
+          <a:effectRef idx="0">
+            <a:schemeClr val="accent1"/>
+          </a:effectRef>
+          <a:fontRef idx="minor">
+            <a:schemeClr val="lt1"/>
+          </a:fontRef>
+        </p:style>
+        <p:txBody>
+          <a:bodyPr rtlCol="0" anchor="ctr"/>
+          <a:lstStyle/>
+          <a:p>
+            <a:pPr algn="ctr"/>
+            <a:endParaRPr lang="en-IN" dirty="0"/>
+          </a:p>
+        </p:txBody>
+      </p:sp>
+      <p:sp>
+        <p:nvSpPr>
+          <p:cNvPr id="49" name="TextBox 48">
+            <a:extLst>
+              <a:ext uri="{FF2B5EF4-FFF2-40B4-BE49-F238E27FC236}">
+                <a16:creationId xmlns:a16="http://schemas.microsoft.com/office/drawing/2014/main" id="{43270365-0837-468C-8DB5-7468014A991C}"/>
+              </a:ext>
+            </a:extLst>
+          </p:cNvPr>
+          <p:cNvSpPr txBox="1"/>
+          <p:nvPr/>
+        </p:nvSpPr>
+        <p:spPr>
+          <a:xfrm>
+            <a:off x="1764163" y="6849988"/>
+            <a:ext cx="1228926" cy="369332"/>
+          </a:xfrm>
+          <a:prstGeom prst="rect">
+            <a:avLst/>
+          </a:prstGeom>
+          <a:noFill/>
+        </p:spPr>
+        <p:txBody>
+          <a:bodyPr wrap="none" rtlCol="0">
+            <a:spAutoFit/>
+          </a:bodyPr>
+          <a:lstStyle/>
+          <a:p>
+            <a:r>
+              <a:rPr lang="en-US" dirty="0"/>
+              <a:t>Item Name</a:t>
+            </a:r>
+            <a:endParaRPr lang="en-IN" dirty="0"/>
+          </a:p>
+        </p:txBody>
+      </p:sp>
+      <p:sp>
+        <p:nvSpPr>
+          <p:cNvPr id="50" name="Rectangle: Rounded Corners 49">
+            <a:extLst>
+              <a:ext uri="{FF2B5EF4-FFF2-40B4-BE49-F238E27FC236}">
+                <a16:creationId xmlns:a16="http://schemas.microsoft.com/office/drawing/2014/main" id="{0C179944-9B38-4F9D-88FA-69A1877583EC}"/>
+              </a:ext>
+            </a:extLst>
+          </p:cNvPr>
+          <p:cNvSpPr/>
+          <p:nvPr/>
+        </p:nvSpPr>
+        <p:spPr>
+          <a:xfrm>
+            <a:off x="1829153" y="7376505"/>
+            <a:ext cx="2327872" cy="2371720"/>
+          </a:xfrm>
+          <a:prstGeom prst="roundRect">
+            <a:avLst>
+              <a:gd name="adj" fmla="val 11213"/>
+            </a:avLst>
+          </a:prstGeom>
+          <a:solidFill>
+            <a:schemeClr val="bg1">
+              <a:lumMod val="95000"/>
+            </a:schemeClr>
+          </a:solidFill>
+          <a:ln w="28575"/>
+        </p:spPr>
+        <p:style>
+          <a:lnRef idx="2">
+            <a:schemeClr val="accent1">
+              <a:shade val="50000"/>
+            </a:schemeClr>
+          </a:lnRef>
+          <a:fillRef idx="1">
+            <a:schemeClr val="accent1"/>
+          </a:fillRef>
+          <a:effectRef idx="0">
+            <a:schemeClr val="accent1"/>
+          </a:effectRef>
+          <a:fontRef idx="minor">
+            <a:schemeClr val="lt1"/>
+          </a:fontRef>
+        </p:style>
+        <p:txBody>
+          <a:bodyPr rtlCol="0" anchor="ctr"/>
+          <a:lstStyle/>
+          <a:p>
+            <a:pPr algn="ctr"/>
+            <a:r>
+              <a:rPr lang="en-US" dirty="0">
+                <a:solidFill>
+                  <a:schemeClr val="bg2">
+                    <a:lumMod val="75000"/>
+                  </a:schemeClr>
+                </a:solidFill>
+              </a:rPr>
+              <a:t>image</a:t>
+            </a:r>
+            <a:endParaRPr lang="en-IN" dirty="0">
+              <a:solidFill>
+                <a:schemeClr val="bg2">
+                  <a:lumMod val="75000"/>
+                </a:schemeClr>
+              </a:solidFill>
+            </a:endParaRPr>
+          </a:p>
+        </p:txBody>
+      </p:sp>
+      <p:sp>
+        <p:nvSpPr>
+          <p:cNvPr id="55" name="Rectangle: Rounded Corners 54">
+            <a:extLst>
+              <a:ext uri="{FF2B5EF4-FFF2-40B4-BE49-F238E27FC236}">
+                <a16:creationId xmlns:a16="http://schemas.microsoft.com/office/drawing/2014/main" id="{8F3AA717-5D95-4F42-B05F-DFBE00D0313E}"/>
+              </a:ext>
+            </a:extLst>
+          </p:cNvPr>
+          <p:cNvSpPr/>
+          <p:nvPr/>
+        </p:nvSpPr>
+        <p:spPr>
+          <a:xfrm>
+            <a:off x="4576789" y="6692803"/>
+            <a:ext cx="2750817" cy="3291496"/>
+          </a:xfrm>
+          <a:prstGeom prst="roundRect">
+            <a:avLst>
+              <a:gd name="adj" fmla="val 1543"/>
+            </a:avLst>
+          </a:prstGeom>
+          <a:solidFill>
+            <a:srgbClr val="F3F3F3"/>
+          </a:solidFill>
+          <a:ln w="28575"/>
+        </p:spPr>
+        <p:style>
+          <a:lnRef idx="2">
+            <a:schemeClr val="accent1">
+              <a:shade val="50000"/>
+            </a:schemeClr>
+          </a:lnRef>
+          <a:fillRef idx="1">
+            <a:schemeClr val="accent1"/>
+          </a:fillRef>
+          <a:effectRef idx="0">
+            <a:schemeClr val="accent1"/>
+          </a:effectRef>
+          <a:fontRef idx="minor">
+            <a:schemeClr val="lt1"/>
+          </a:fontRef>
+        </p:style>
+        <p:txBody>
+          <a:bodyPr rtlCol="0" anchor="ctr"/>
+          <a:lstStyle/>
+          <a:p>
+            <a:pPr algn="ctr"/>
+            <a:endParaRPr lang="en-IN" dirty="0"/>
+          </a:p>
+        </p:txBody>
+      </p:sp>
+      <p:sp>
+        <p:nvSpPr>
+          <p:cNvPr id="56" name="TextBox 55">
+            <a:extLst>
+              <a:ext uri="{FF2B5EF4-FFF2-40B4-BE49-F238E27FC236}">
+                <a16:creationId xmlns:a16="http://schemas.microsoft.com/office/drawing/2014/main" id="{7D45AD4A-9A50-4E87-A942-8E43658F21F2}"/>
+              </a:ext>
+            </a:extLst>
+          </p:cNvPr>
+          <p:cNvSpPr txBox="1"/>
+          <p:nvPr/>
+        </p:nvSpPr>
+        <p:spPr>
+          <a:xfrm>
+            <a:off x="4723271" y="6849988"/>
+            <a:ext cx="1228926" cy="369332"/>
+          </a:xfrm>
+          <a:prstGeom prst="rect">
+            <a:avLst/>
+          </a:prstGeom>
+          <a:noFill/>
+        </p:spPr>
+        <p:txBody>
+          <a:bodyPr wrap="none" rtlCol="0">
+            <a:spAutoFit/>
+          </a:bodyPr>
+          <a:lstStyle/>
+          <a:p>
+            <a:r>
+              <a:rPr lang="en-US" dirty="0"/>
+              <a:t>Item Name</a:t>
+            </a:r>
+            <a:endParaRPr lang="en-IN" dirty="0"/>
+          </a:p>
+        </p:txBody>
+      </p:sp>
+      <p:sp>
+        <p:nvSpPr>
+          <p:cNvPr id="57" name="Rectangle: Rounded Corners 56">
+            <a:extLst>
+              <a:ext uri="{FF2B5EF4-FFF2-40B4-BE49-F238E27FC236}">
+                <a16:creationId xmlns:a16="http://schemas.microsoft.com/office/drawing/2014/main" id="{55522410-F849-4ED3-BB37-FAE200FBD525}"/>
+              </a:ext>
+            </a:extLst>
+          </p:cNvPr>
+          <p:cNvSpPr/>
+          <p:nvPr/>
+        </p:nvSpPr>
+        <p:spPr>
+          <a:xfrm>
+            <a:off x="4788261" y="7376505"/>
+            <a:ext cx="2327872" cy="2371720"/>
+          </a:xfrm>
+          <a:prstGeom prst="roundRect">
+            <a:avLst>
+              <a:gd name="adj" fmla="val 11213"/>
+            </a:avLst>
+          </a:prstGeom>
+          <a:solidFill>
+            <a:schemeClr val="bg1">
+              <a:lumMod val="95000"/>
+            </a:schemeClr>
+          </a:solidFill>
+          <a:ln w="28575"/>
+        </p:spPr>
+        <p:style>
+          <a:lnRef idx="2">
+            <a:schemeClr val="accent1">
+              <a:shade val="50000"/>
+            </a:schemeClr>
+          </a:lnRef>
+          <a:fillRef idx="1">
+            <a:schemeClr val="accent1"/>
+          </a:fillRef>
+          <a:effectRef idx="0">
+            <a:schemeClr val="accent1"/>
+          </a:effectRef>
+          <a:fontRef idx="minor">
+            <a:schemeClr val="lt1"/>
+          </a:fontRef>
+        </p:style>
+        <p:txBody>
+          <a:bodyPr rtlCol="0" anchor="ctr"/>
+          <a:lstStyle/>
+          <a:p>
+            <a:pPr algn="ctr"/>
+            <a:r>
+              <a:rPr lang="en-US" dirty="0">
+                <a:solidFill>
+                  <a:schemeClr val="bg2">
+                    <a:lumMod val="75000"/>
+                  </a:schemeClr>
+                </a:solidFill>
+              </a:rPr>
+              <a:t>image</a:t>
+            </a:r>
+            <a:endParaRPr lang="en-IN" dirty="0">
+              <a:solidFill>
+                <a:schemeClr val="bg2">
+                  <a:lumMod val="75000"/>
+                </a:schemeClr>
+              </a:solidFill>
+            </a:endParaRPr>
+          </a:p>
+        </p:txBody>
+      </p:sp>
+      <p:sp>
+        <p:nvSpPr>
+          <p:cNvPr id="59" name="Rectangle: Rounded Corners 58">
+            <a:extLst>
+              <a:ext uri="{FF2B5EF4-FFF2-40B4-BE49-F238E27FC236}">
+                <a16:creationId xmlns:a16="http://schemas.microsoft.com/office/drawing/2014/main" id="{755C04A8-1C31-482F-AE4F-01056B92DEB1}"/>
+              </a:ext>
+            </a:extLst>
+          </p:cNvPr>
+          <p:cNvSpPr/>
+          <p:nvPr/>
+        </p:nvSpPr>
+        <p:spPr>
+          <a:xfrm>
+            <a:off x="7535897" y="6692803"/>
+            <a:ext cx="2750817" cy="3291496"/>
+          </a:xfrm>
+          <a:prstGeom prst="roundRect">
+            <a:avLst>
+              <a:gd name="adj" fmla="val 1543"/>
+            </a:avLst>
+          </a:prstGeom>
+          <a:solidFill>
+            <a:srgbClr val="F3F3F3"/>
+          </a:solidFill>
+          <a:ln w="28575"/>
+        </p:spPr>
+        <p:style>
+          <a:lnRef idx="2">
+            <a:schemeClr val="accent1">
+              <a:shade val="50000"/>
+            </a:schemeClr>
+          </a:lnRef>
+          <a:fillRef idx="1">
+            <a:schemeClr val="accent1"/>
+          </a:fillRef>
+          <a:effectRef idx="0">
+            <a:schemeClr val="accent1"/>
+          </a:effectRef>
+          <a:fontRef idx="minor">
+            <a:schemeClr val="lt1"/>
+          </a:fontRef>
+        </p:style>
+        <p:txBody>
+          <a:bodyPr rtlCol="0" anchor="ctr"/>
+          <a:lstStyle/>
+          <a:p>
+            <a:pPr algn="ctr"/>
+            <a:endParaRPr lang="en-IN" dirty="0"/>
+          </a:p>
+        </p:txBody>
+      </p:sp>
+      <p:sp>
+        <p:nvSpPr>
+          <p:cNvPr id="60" name="TextBox 59">
+            <a:extLst>
+              <a:ext uri="{FF2B5EF4-FFF2-40B4-BE49-F238E27FC236}">
+                <a16:creationId xmlns:a16="http://schemas.microsoft.com/office/drawing/2014/main" id="{F509F1EA-1457-4372-9B0F-C82B3B0A4AF1}"/>
+              </a:ext>
+            </a:extLst>
+          </p:cNvPr>
+          <p:cNvSpPr txBox="1"/>
+          <p:nvPr/>
+        </p:nvSpPr>
+        <p:spPr>
+          <a:xfrm>
+            <a:off x="7682379" y="6849988"/>
+            <a:ext cx="1228926" cy="369332"/>
+          </a:xfrm>
+          <a:prstGeom prst="rect">
+            <a:avLst/>
+          </a:prstGeom>
+          <a:noFill/>
+        </p:spPr>
+        <p:txBody>
+          <a:bodyPr wrap="none" rtlCol="0">
+            <a:spAutoFit/>
+          </a:bodyPr>
+          <a:lstStyle/>
+          <a:p>
+            <a:r>
+              <a:rPr lang="en-US" dirty="0"/>
+              <a:t>Item Name</a:t>
+            </a:r>
+            <a:endParaRPr lang="en-IN" dirty="0"/>
+          </a:p>
+        </p:txBody>
+      </p:sp>
+      <p:sp>
+        <p:nvSpPr>
+          <p:cNvPr id="61" name="Rectangle: Rounded Corners 60">
+            <a:extLst>
+              <a:ext uri="{FF2B5EF4-FFF2-40B4-BE49-F238E27FC236}">
+                <a16:creationId xmlns:a16="http://schemas.microsoft.com/office/drawing/2014/main" id="{017C42E3-7768-400D-AA4F-1371076CFFE1}"/>
+              </a:ext>
+            </a:extLst>
+          </p:cNvPr>
+          <p:cNvSpPr/>
+          <p:nvPr/>
+        </p:nvSpPr>
+        <p:spPr>
+          <a:xfrm>
+            <a:off x="7747369" y="7376505"/>
+            <a:ext cx="2327872" cy="2371720"/>
+          </a:xfrm>
+          <a:prstGeom prst="roundRect">
+            <a:avLst>
+              <a:gd name="adj" fmla="val 11213"/>
+            </a:avLst>
+          </a:prstGeom>
+          <a:solidFill>
+            <a:schemeClr val="bg1">
+              <a:lumMod val="95000"/>
+            </a:schemeClr>
+          </a:solidFill>
+          <a:ln w="28575"/>
+        </p:spPr>
+        <p:style>
+          <a:lnRef idx="2">
+            <a:schemeClr val="accent1">
+              <a:shade val="50000"/>
+            </a:schemeClr>
+          </a:lnRef>
+          <a:fillRef idx="1">
+            <a:schemeClr val="accent1"/>
+          </a:fillRef>
+          <a:effectRef idx="0">
+            <a:schemeClr val="accent1"/>
+          </a:effectRef>
+          <a:fontRef idx="minor">
+            <a:schemeClr val="lt1"/>
+          </a:fontRef>
+        </p:style>
+        <p:txBody>
+          <a:bodyPr rtlCol="0" anchor="ctr"/>
+          <a:lstStyle/>
+          <a:p>
+            <a:pPr algn="ctr"/>
+            <a:r>
+              <a:rPr lang="en-US" dirty="0">
+                <a:solidFill>
+                  <a:schemeClr val="bg2">
+                    <a:lumMod val="75000"/>
+                  </a:schemeClr>
+                </a:solidFill>
+              </a:rPr>
+              <a:t>image</a:t>
+            </a:r>
+            <a:endParaRPr lang="en-IN" dirty="0">
+              <a:solidFill>
+                <a:schemeClr val="bg2">
+                  <a:lumMod val="75000"/>
+                </a:schemeClr>
+              </a:solidFill>
+            </a:endParaRPr>
+          </a:p>
+        </p:txBody>
+      </p:sp>
+      <p:sp>
+        <p:nvSpPr>
+          <p:cNvPr id="63" name="TextBox 62">
+            <a:extLst>
+              <a:ext uri="{FF2B5EF4-FFF2-40B4-BE49-F238E27FC236}">
+                <a16:creationId xmlns:a16="http://schemas.microsoft.com/office/drawing/2014/main" id="{5BEEA67F-3644-4FC0-9D5E-7C67552B9EF5}"/>
+              </a:ext>
+            </a:extLst>
+          </p:cNvPr>
+          <p:cNvSpPr txBox="1"/>
+          <p:nvPr/>
+        </p:nvSpPr>
+        <p:spPr>
+          <a:xfrm>
+            <a:off x="1617681" y="6055695"/>
+            <a:ext cx="2104359" cy="461665"/>
+          </a:xfrm>
+          <a:prstGeom prst="rect">
+            <a:avLst/>
+          </a:prstGeom>
+          <a:noFill/>
+        </p:spPr>
+        <p:txBody>
+          <a:bodyPr wrap="none" rtlCol="0">
+            <a:spAutoFit/>
+          </a:bodyPr>
+          <a:lstStyle/>
+          <a:p>
+            <a:r>
+              <a:rPr lang="en-US" sz="2400" b="1" dirty="0">
+                <a:latin typeface="Adobe Garamond Pro" panose="02020502060506020403" pitchFamily="18" charset="0"/>
+                <a:cs typeface="Aldhabi" panose="020B0604020202020204" pitchFamily="2" charset="-78"/>
+              </a:rPr>
+              <a:t>YOUR ITEMS</a:t>
+            </a:r>
+            <a:endParaRPr lang="en-IN" sz="2400" b="1" dirty="0">
+              <a:latin typeface="Adobe Garamond Pro" panose="02020502060506020403" pitchFamily="18" charset="0"/>
+              <a:cs typeface="Aldhabi" panose="020B0604020202020204" pitchFamily="2" charset="-78"/>
+            </a:endParaRPr>
+          </a:p>
+        </p:txBody>
+      </p:sp>
+      <p:sp>
+        <p:nvSpPr>
+          <p:cNvPr id="66" name="Oval 65">
+            <a:extLst>
+              <a:ext uri="{FF2B5EF4-FFF2-40B4-BE49-F238E27FC236}">
+                <a16:creationId xmlns:a16="http://schemas.microsoft.com/office/drawing/2014/main" id="{22314E0D-AA5E-4399-9730-315A96081F06}"/>
+              </a:ext>
+            </a:extLst>
+          </p:cNvPr>
+          <p:cNvSpPr/>
+          <p:nvPr/>
+        </p:nvSpPr>
+        <p:spPr>
+          <a:xfrm>
+            <a:off x="513024" y="3314134"/>
+            <a:ext cx="578841" cy="578841"/>
+          </a:xfrm>
+          <a:prstGeom prst="ellipse">
+            <a:avLst/>
+          </a:prstGeom>
+          <a:solidFill>
+            <a:schemeClr val="bg1">
+              <a:lumMod val="95000"/>
+            </a:schemeClr>
+          </a:solidFill>
+          <a:ln>
+            <a:noFill/>
+          </a:ln>
+          <a:effectLst>
+            <a:outerShdw blurRad="63500" sx="102000" sy="102000" algn="ctr" rotWithShape="0">
+              <a:prstClr val="black">
+                <a:alpha val="40000"/>
+              </a:prstClr>
+            </a:outerShdw>
+          </a:effectLst>
+        </p:spPr>
+        <p:style>
+          <a:lnRef idx="2">
+            <a:schemeClr val="accent1">
+              <a:shade val="50000"/>
+            </a:schemeClr>
+          </a:lnRef>
+          <a:fillRef idx="1">
+            <a:schemeClr val="accent1"/>
+          </a:fillRef>
+          <a:effectRef idx="0">
+            <a:schemeClr val="accent1"/>
+          </a:effectRef>
+          <a:fontRef idx="minor">
+            <a:schemeClr val="lt1"/>
+          </a:fontRef>
+        </p:style>
+        <p:txBody>
+          <a:bodyPr rtlCol="0" anchor="ctr"/>
+          <a:lstStyle/>
+          <a:p>
+            <a:pPr algn="ctr"/>
+            <a:r>
+              <a:rPr lang="en-US" sz="2400" dirty="0">
+                <a:solidFill>
+                  <a:schemeClr val="tx1">
+                    <a:lumMod val="50000"/>
+                    <a:lumOff val="50000"/>
+                  </a:schemeClr>
+                </a:solidFill>
+              </a:rPr>
+              <a:t>&lt;</a:t>
+            </a:r>
+            <a:endParaRPr lang="en-IN" sz="2400" dirty="0">
+              <a:solidFill>
+                <a:schemeClr val="tx1">
+                  <a:lumMod val="50000"/>
+                  <a:lumOff val="50000"/>
+                </a:schemeClr>
+              </a:solidFill>
+            </a:endParaRPr>
+          </a:p>
+        </p:txBody>
+      </p:sp>
+      <p:sp>
+        <p:nvSpPr>
+          <p:cNvPr id="67" name="Oval 66">
+            <a:extLst>
+              <a:ext uri="{FF2B5EF4-FFF2-40B4-BE49-F238E27FC236}">
+                <a16:creationId xmlns:a16="http://schemas.microsoft.com/office/drawing/2014/main" id="{B890A6EC-0969-4612-9D34-9954D17315E6}"/>
+              </a:ext>
+            </a:extLst>
+          </p:cNvPr>
+          <p:cNvSpPr/>
+          <p:nvPr/>
+        </p:nvSpPr>
+        <p:spPr>
+          <a:xfrm>
+            <a:off x="10785074" y="3314134"/>
+            <a:ext cx="578841" cy="578841"/>
+          </a:xfrm>
+          <a:prstGeom prst="ellipse">
+            <a:avLst/>
+          </a:prstGeom>
+          <a:solidFill>
+            <a:schemeClr val="bg1">
+              <a:lumMod val="95000"/>
+            </a:schemeClr>
+          </a:solidFill>
+          <a:ln>
+            <a:noFill/>
+          </a:ln>
+          <a:effectLst>
+            <a:outerShdw blurRad="63500" sx="102000" sy="102000" algn="ctr" rotWithShape="0">
+              <a:prstClr val="black">
+                <a:alpha val="40000"/>
+              </a:prstClr>
+            </a:outerShdw>
+          </a:effectLst>
+        </p:spPr>
+        <p:style>
+          <a:lnRef idx="2">
+            <a:schemeClr val="accent1">
+              <a:shade val="50000"/>
+            </a:schemeClr>
+          </a:lnRef>
+          <a:fillRef idx="1">
+            <a:schemeClr val="accent1"/>
+          </a:fillRef>
+          <a:effectRef idx="0">
+            <a:schemeClr val="accent1"/>
+          </a:effectRef>
+          <a:fontRef idx="minor">
+            <a:schemeClr val="lt1"/>
+          </a:fontRef>
+        </p:style>
+        <p:txBody>
+          <a:bodyPr rtlCol="0" anchor="ctr"/>
+          <a:lstStyle/>
+          <a:p>
+            <a:pPr algn="ctr"/>
+            <a:r>
+              <a:rPr lang="en-US" sz="2400" dirty="0">
+                <a:solidFill>
+                  <a:schemeClr val="tx1">
+                    <a:lumMod val="50000"/>
+                    <a:lumOff val="50000"/>
+                  </a:schemeClr>
+                </a:solidFill>
+              </a:rPr>
+              <a:t>&gt;</a:t>
+            </a:r>
+            <a:endParaRPr lang="en-IN" sz="2400" dirty="0">
+              <a:solidFill>
+                <a:schemeClr val="tx1">
+                  <a:lumMod val="50000"/>
+                  <a:lumOff val="50000"/>
+                </a:schemeClr>
+              </a:solidFill>
+            </a:endParaRPr>
+          </a:p>
+        </p:txBody>
+      </p:sp>
+      <p:sp>
+        <p:nvSpPr>
+          <p:cNvPr id="68" name="Oval 67">
+            <a:extLst>
+              <a:ext uri="{FF2B5EF4-FFF2-40B4-BE49-F238E27FC236}">
+                <a16:creationId xmlns:a16="http://schemas.microsoft.com/office/drawing/2014/main" id="{8733F54A-4820-4497-B836-1D991FE6D761}"/>
+              </a:ext>
+            </a:extLst>
+          </p:cNvPr>
+          <p:cNvSpPr/>
+          <p:nvPr/>
+        </p:nvSpPr>
+        <p:spPr>
+          <a:xfrm>
+            <a:off x="513024" y="8043025"/>
+            <a:ext cx="578841" cy="578841"/>
+          </a:xfrm>
+          <a:prstGeom prst="ellipse">
+            <a:avLst/>
+          </a:prstGeom>
+          <a:solidFill>
+            <a:schemeClr val="bg1">
+              <a:lumMod val="95000"/>
+            </a:schemeClr>
+          </a:solidFill>
+          <a:ln>
+            <a:noFill/>
+          </a:ln>
+          <a:effectLst>
+            <a:outerShdw blurRad="63500" sx="102000" sy="102000" algn="ctr" rotWithShape="0">
+              <a:prstClr val="black">
+                <a:alpha val="40000"/>
+              </a:prstClr>
+            </a:outerShdw>
+          </a:effectLst>
+        </p:spPr>
+        <p:style>
+          <a:lnRef idx="2">
+            <a:schemeClr val="accent1">
+              <a:shade val="50000"/>
+            </a:schemeClr>
+          </a:lnRef>
+          <a:fillRef idx="1">
+            <a:schemeClr val="accent1"/>
+          </a:fillRef>
+          <a:effectRef idx="0">
+            <a:schemeClr val="accent1"/>
+          </a:effectRef>
+          <a:fontRef idx="minor">
+            <a:schemeClr val="lt1"/>
+          </a:fontRef>
+        </p:style>
+        <p:txBody>
+          <a:bodyPr rtlCol="0" anchor="ctr"/>
+          <a:lstStyle/>
+          <a:p>
+            <a:pPr algn="ctr"/>
+            <a:r>
+              <a:rPr lang="en-US" sz="2400" dirty="0">
+                <a:solidFill>
+                  <a:schemeClr val="tx1">
+                    <a:lumMod val="50000"/>
+                    <a:lumOff val="50000"/>
+                  </a:schemeClr>
+                </a:solidFill>
+              </a:rPr>
+              <a:t>&lt;</a:t>
+            </a:r>
+            <a:endParaRPr lang="en-IN" sz="2400" dirty="0">
+              <a:solidFill>
+                <a:schemeClr val="tx1">
+                  <a:lumMod val="50000"/>
+                  <a:lumOff val="50000"/>
+                </a:schemeClr>
+              </a:solidFill>
+            </a:endParaRPr>
+          </a:p>
+        </p:txBody>
+      </p:sp>
+      <p:sp>
+        <p:nvSpPr>
+          <p:cNvPr id="69" name="Oval 68">
+            <a:extLst>
+              <a:ext uri="{FF2B5EF4-FFF2-40B4-BE49-F238E27FC236}">
+                <a16:creationId xmlns:a16="http://schemas.microsoft.com/office/drawing/2014/main" id="{69FE2423-AB58-4752-8A93-B5864A0F6AEC}"/>
+              </a:ext>
+            </a:extLst>
+          </p:cNvPr>
+          <p:cNvSpPr/>
+          <p:nvPr/>
+        </p:nvSpPr>
+        <p:spPr>
+          <a:xfrm>
+            <a:off x="10785074" y="8043025"/>
+            <a:ext cx="578841" cy="578841"/>
+          </a:xfrm>
+          <a:prstGeom prst="ellipse">
+            <a:avLst/>
+          </a:prstGeom>
+          <a:solidFill>
+            <a:schemeClr val="bg1">
+              <a:lumMod val="95000"/>
+            </a:schemeClr>
+          </a:solidFill>
+          <a:ln>
+            <a:noFill/>
+          </a:ln>
+          <a:effectLst>
+            <a:outerShdw blurRad="63500" sx="102000" sy="102000" algn="ctr" rotWithShape="0">
+              <a:prstClr val="black">
+                <a:alpha val="40000"/>
+              </a:prstClr>
+            </a:outerShdw>
+          </a:effectLst>
+        </p:spPr>
+        <p:style>
+          <a:lnRef idx="2">
+            <a:schemeClr val="accent1">
+              <a:shade val="50000"/>
+            </a:schemeClr>
+          </a:lnRef>
+          <a:fillRef idx="1">
+            <a:schemeClr val="accent1"/>
+          </a:fillRef>
+          <a:effectRef idx="0">
+            <a:schemeClr val="accent1"/>
+          </a:effectRef>
+          <a:fontRef idx="minor">
+            <a:schemeClr val="lt1"/>
+          </a:fontRef>
+        </p:style>
+        <p:txBody>
+          <a:bodyPr rtlCol="0" anchor="ctr"/>
+          <a:lstStyle/>
+          <a:p>
+            <a:pPr algn="ctr"/>
+            <a:r>
+              <a:rPr lang="en-US" sz="2400" dirty="0">
+                <a:solidFill>
+                  <a:schemeClr val="tx1">
+                    <a:lumMod val="50000"/>
+                    <a:lumOff val="50000"/>
+                  </a:schemeClr>
+                </a:solidFill>
+              </a:rPr>
+              <a:t>&gt;</a:t>
+            </a:r>
+            <a:endParaRPr lang="en-IN" sz="2400" dirty="0">
+              <a:solidFill>
+                <a:schemeClr val="tx1">
+                  <a:lumMod val="50000"/>
+                  <a:lumOff val="50000"/>
+                </a:schemeClr>
+              </a:solidFill>
+            </a:endParaRPr>
+          </a:p>
+        </p:txBody>
+      </p:sp>
+      <p:sp>
+        <p:nvSpPr>
+          <p:cNvPr id="70" name="Rectangle: Rounded Corners 69">
+            <a:extLst>
+              <a:ext uri="{FF2B5EF4-FFF2-40B4-BE49-F238E27FC236}">
+                <a16:creationId xmlns:a16="http://schemas.microsoft.com/office/drawing/2014/main" id="{0C9715F4-E37F-4369-AEBD-1ED18EAC78D0}"/>
+              </a:ext>
+            </a:extLst>
+          </p:cNvPr>
+          <p:cNvSpPr/>
+          <p:nvPr/>
+        </p:nvSpPr>
+        <p:spPr>
+          <a:xfrm>
+            <a:off x="1829151" y="9221117"/>
+            <a:ext cx="2327874" cy="527108"/>
+          </a:xfrm>
+          <a:prstGeom prst="roundRect">
+            <a:avLst>
+              <a:gd name="adj" fmla="val 50000"/>
+            </a:avLst>
+          </a:prstGeom>
+          <a:solidFill>
+            <a:schemeClr val="accent5">
+              <a:lumMod val="75000"/>
+            </a:schemeClr>
+          </a:solidFill>
+        </p:spPr>
+        <p:style>
+          <a:lnRef idx="2">
+            <a:schemeClr val="accent1">
+              <a:shade val="50000"/>
+            </a:schemeClr>
+          </a:lnRef>
+          <a:fillRef idx="1">
+            <a:schemeClr val="accent1"/>
+          </a:fillRef>
+          <a:effectRef idx="0">
+            <a:schemeClr val="accent1"/>
+          </a:effectRef>
+          <a:fontRef idx="minor">
+            <a:schemeClr val="lt1"/>
+          </a:fontRef>
+        </p:style>
+        <p:txBody>
+          <a:bodyPr rtlCol="0" anchor="ctr"/>
+          <a:lstStyle/>
+          <a:p>
+            <a:r>
+              <a:rPr lang="en-US" sz="1400" dirty="0">
+                <a:solidFill>
+                  <a:schemeClr val="bg1"/>
+                </a:solidFill>
+              </a:rPr>
+              <a:t>Currently Bidding</a:t>
+            </a:r>
+            <a:endParaRPr lang="en-IN" sz="1400" dirty="0">
+              <a:solidFill>
+                <a:schemeClr val="bg1"/>
+              </a:solidFill>
+            </a:endParaRPr>
+          </a:p>
+        </p:txBody>
+      </p:sp>
+      <p:sp>
+        <p:nvSpPr>
+          <p:cNvPr id="72" name="Rectangle: Rounded Corners 71">
+            <a:extLst>
+              <a:ext uri="{FF2B5EF4-FFF2-40B4-BE49-F238E27FC236}">
+                <a16:creationId xmlns:a16="http://schemas.microsoft.com/office/drawing/2014/main" id="{02F0572D-34E5-458F-B400-C18047CEFB12}"/>
+              </a:ext>
+            </a:extLst>
+          </p:cNvPr>
+          <p:cNvSpPr/>
+          <p:nvPr/>
+        </p:nvSpPr>
+        <p:spPr>
+          <a:xfrm>
+            <a:off x="4788259" y="9221117"/>
+            <a:ext cx="2327874" cy="527108"/>
+          </a:xfrm>
+          <a:prstGeom prst="roundRect">
+            <a:avLst>
+              <a:gd name="adj" fmla="val 50000"/>
+            </a:avLst>
+          </a:prstGeom>
+          <a:solidFill>
+            <a:schemeClr val="accent5">
+              <a:lumMod val="75000"/>
+            </a:schemeClr>
+          </a:solidFill>
+        </p:spPr>
+        <p:style>
+          <a:lnRef idx="2">
+            <a:schemeClr val="accent1">
+              <a:shade val="50000"/>
+            </a:schemeClr>
+          </a:lnRef>
+          <a:fillRef idx="1">
+            <a:schemeClr val="accent1"/>
+          </a:fillRef>
+          <a:effectRef idx="0">
+            <a:schemeClr val="accent1"/>
+          </a:effectRef>
+          <a:fontRef idx="minor">
+            <a:schemeClr val="lt1"/>
+          </a:fontRef>
+        </p:style>
+        <p:txBody>
+          <a:bodyPr rtlCol="0" anchor="ctr"/>
+          <a:lstStyle/>
+          <a:p>
+            <a:r>
+              <a:rPr lang="en-US" sz="1400" dirty="0">
+                <a:solidFill>
+                  <a:schemeClr val="bg1"/>
+                </a:solidFill>
+              </a:rPr>
+              <a:t>Claimed by XYZ</a:t>
+            </a:r>
+            <a:endParaRPr lang="en-IN" sz="1400" dirty="0">
+              <a:solidFill>
+                <a:schemeClr val="bg1"/>
+              </a:solidFill>
+            </a:endParaRPr>
+          </a:p>
+        </p:txBody>
+      </p:sp>
+      <p:sp>
+        <p:nvSpPr>
+          <p:cNvPr id="73" name="TextBox 72">
+            <a:extLst>
+              <a:ext uri="{FF2B5EF4-FFF2-40B4-BE49-F238E27FC236}">
+                <a16:creationId xmlns:a16="http://schemas.microsoft.com/office/drawing/2014/main" id="{DD5E9F02-F5E9-40D4-8176-8BA83A2E5EE8}"/>
+              </a:ext>
+            </a:extLst>
+          </p:cNvPr>
+          <p:cNvSpPr txBox="1"/>
+          <p:nvPr/>
+        </p:nvSpPr>
+        <p:spPr>
+          <a:xfrm>
+            <a:off x="6693456" y="9221117"/>
             <a:ext cx="364202" cy="523220"/>
           </a:xfrm>
           <a:prstGeom prst="rect">
@@ -9946,10 +9967,74 @@
       </p:sp>
       <p:sp>
         <p:nvSpPr>
-          <p:cNvPr id="17" name="TextBox 16">
-            <a:extLst>
-              <a:ext uri="{FF2B5EF4-FFF2-40B4-BE49-F238E27FC236}">
-                <a16:creationId xmlns:a16="http://schemas.microsoft.com/office/drawing/2014/main" id="{84873588-0186-4922-AAEA-FFF3291532AC}"/>
+          <p:cNvPr id="74" name="Rectangle: Rounded Corners 73">
+            <a:extLst>
+              <a:ext uri="{FF2B5EF4-FFF2-40B4-BE49-F238E27FC236}">
+                <a16:creationId xmlns:a16="http://schemas.microsoft.com/office/drawing/2014/main" id="{E86CADDE-1E1F-45DC-BEC6-85952951BC34}"/>
+              </a:ext>
+            </a:extLst>
+          </p:cNvPr>
+          <p:cNvSpPr/>
+          <p:nvPr/>
+        </p:nvSpPr>
+        <p:spPr>
+          <a:xfrm>
+            <a:off x="7747367" y="9221117"/>
+            <a:ext cx="2327874" cy="527108"/>
+          </a:xfrm>
+          <a:prstGeom prst="roundRect">
+            <a:avLst>
+              <a:gd name="adj" fmla="val 50000"/>
+            </a:avLst>
+          </a:prstGeom>
+          <a:solidFill>
+            <a:schemeClr val="accent5">
+              <a:lumMod val="75000"/>
+            </a:schemeClr>
+          </a:solidFill>
+        </p:spPr>
+        <p:style>
+          <a:lnRef idx="2">
+            <a:schemeClr val="accent1">
+              <a:shade val="50000"/>
+            </a:schemeClr>
+          </a:lnRef>
+          <a:fillRef idx="1">
+            <a:schemeClr val="accent1"/>
+          </a:fillRef>
+          <a:effectRef idx="0">
+            <a:schemeClr val="accent1"/>
+          </a:effectRef>
+          <a:fontRef idx="minor">
+            <a:schemeClr val="lt1"/>
+          </a:fontRef>
+        </p:style>
+        <p:txBody>
+          <a:bodyPr rtlCol="0" anchor="ctr"/>
+          <a:lstStyle/>
+          <a:p>
+            <a:r>
+              <a:rPr lang="en-US" sz="1400" dirty="0">
+                <a:solidFill>
+                  <a:schemeClr val="bg1"/>
+                </a:solidFill>
+              </a:rPr>
+              <a:t>Currently Bidding</a:t>
+            </a:r>
+            <a:endParaRPr lang="en-IN" sz="1400" dirty="0">
+              <a:solidFill>
+                <a:schemeClr val="bg1"/>
+              </a:solidFill>
+            </a:endParaRPr>
+          </a:p>
+        </p:txBody>
+      </p:sp>
+      <p:sp>
+        <p:nvSpPr>
+          <p:cNvPr id="75" name="TextBox 74">
+            <a:extLst>
+              <a:ext uri="{FF2B5EF4-FFF2-40B4-BE49-F238E27FC236}">
+                <a16:creationId xmlns:a16="http://schemas.microsoft.com/office/drawing/2014/main" id="{8710848E-5829-4D5B-8EC7-4AD40BC3038B}"/>
               </a:ext>
             </a:extLst>
           </p:cNvPr>
@@ -9958,8 +10043,8 @@
         </p:nvSpPr>
         <p:spPr>
           <a:xfrm>
-            <a:off x="6413998" y="5887495"/>
-            <a:ext cx="820033" cy="276999"/>
+            <a:off x="9652564" y="9221117"/>
+            <a:ext cx="364202" cy="523220"/>
           </a:xfrm>
           <a:prstGeom prst="rect">
             <a:avLst/>
@@ -9973,110 +10058,25 @@
           <a:lstStyle/>
           <a:p>
             <a:r>
-              <a:rPr lang="en-US" sz="1200" b="1" dirty="0">
+              <a:rPr lang="en-US" sz="2800" dirty="0">
                 <a:solidFill>
-                  <a:srgbClr val="0070C0"/>
+                  <a:schemeClr val="bg1"/>
                 </a:solidFill>
               </a:rPr>
-              <a:t>LESS INFO</a:t>
-            </a:r>
-            <a:endParaRPr lang="en-IN" sz="1200" b="1" dirty="0">
+              <a:t>+</a:t>
+            </a:r>
+            <a:endParaRPr lang="en-IN" sz="2800" dirty="0">
               <a:solidFill>
-                <a:srgbClr val="0070C0"/>
+                <a:schemeClr val="bg1"/>
               </a:solidFill>
             </a:endParaRPr>
-          </a:p>
-        </p:txBody>
-      </p:sp>
-      <p:sp>
-        <p:nvSpPr>
-          <p:cNvPr id="18" name="TextBox 17">
-            <a:extLst>
-              <a:ext uri="{FF2B5EF4-FFF2-40B4-BE49-F238E27FC236}">
-                <a16:creationId xmlns:a16="http://schemas.microsoft.com/office/drawing/2014/main" id="{98E6E3D5-FD56-4D51-B9B7-1352A6B3A4A6}"/>
-              </a:ext>
-            </a:extLst>
-          </p:cNvPr>
-          <p:cNvSpPr txBox="1"/>
-          <p:nvPr/>
-        </p:nvSpPr>
-        <p:spPr>
-          <a:xfrm>
-            <a:off x="6413998" y="5020341"/>
-            <a:ext cx="2327872" cy="276999"/>
-          </a:xfrm>
-          <a:prstGeom prst="rect">
-            <a:avLst/>
-          </a:prstGeom>
-          <a:noFill/>
-        </p:spPr>
-        <p:txBody>
-          <a:bodyPr wrap="square" rtlCol="0">
-            <a:spAutoFit/>
-          </a:bodyPr>
-          <a:lstStyle/>
-          <a:p>
-            <a:pPr algn="just"/>
-            <a:r>
-              <a:rPr lang="en-US" sz="1200" b="1" dirty="0"/>
-              <a:t>Deadline – </a:t>
-            </a:r>
-            <a:r>
-              <a:rPr lang="en-US" sz="1200" dirty="0"/>
-              <a:t>12/03/2020</a:t>
-            </a:r>
-            <a:endParaRPr lang="en-IN" sz="1200" dirty="0"/>
-          </a:p>
-        </p:txBody>
-      </p:sp>
-      <p:sp>
-        <p:nvSpPr>
-          <p:cNvPr id="19" name="TextBox 18">
-            <a:extLst>
-              <a:ext uri="{FF2B5EF4-FFF2-40B4-BE49-F238E27FC236}">
-                <a16:creationId xmlns:a16="http://schemas.microsoft.com/office/drawing/2014/main" id="{2A9E7004-F105-421E-9D69-70C156BE0115}"/>
-              </a:ext>
-            </a:extLst>
-          </p:cNvPr>
-          <p:cNvSpPr txBox="1"/>
-          <p:nvPr/>
-        </p:nvSpPr>
-        <p:spPr>
-          <a:xfrm>
-            <a:off x="6413998" y="5379696"/>
-            <a:ext cx="2327872" cy="461665"/>
-          </a:xfrm>
-          <a:prstGeom prst="rect">
-            <a:avLst/>
-          </a:prstGeom>
-          <a:noFill/>
-        </p:spPr>
-        <p:txBody>
-          <a:bodyPr wrap="square" rtlCol="0">
-            <a:spAutoFit/>
-          </a:bodyPr>
-          <a:lstStyle/>
-          <a:p>
-            <a:pPr algn="just"/>
-            <a:r>
-              <a:rPr lang="en-US" sz="1200" b="1" dirty="0"/>
-              <a:t>Current Highest Bidder</a:t>
-            </a:r>
-          </a:p>
-          <a:p>
-            <a:pPr algn="just"/>
-            <a:r>
-              <a:rPr lang="en-US" sz="1200" dirty="0"/>
-              <a:t>Name of person</a:t>
-            </a:r>
-            <a:endParaRPr lang="en-IN" sz="1200" dirty="0"/>
           </a:p>
         </p:txBody>
       </p:sp>
     </p:spTree>
     <p:extLst>
       <p:ext uri="{BB962C8B-B14F-4D97-AF65-F5344CB8AC3E}">
-        <p14:creationId xmlns:p14="http://schemas.microsoft.com/office/powerpoint/2010/main" val="3155803658"/>
+        <p14:creationId xmlns:p14="http://schemas.microsoft.com/office/powerpoint/2010/main" val="4172842305"/>
       </p:ext>
     </p:extLst>
   </p:cSld>

</xml_diff>